<commit_message>
Frist draft and other changes
</commit_message>
<xml_diff>
--- a/docs/Design & Log/Designs.pptx
+++ b/docs/Design & Log/Designs.pptx
@@ -78,7 +78,9 @@
           </a:prstGeom>
         </p:spPr>
         <p:txBody>
-          <a:bodyPr lIns="0" rIns="0" tIns="0" bIns="0" anchor="ctr"/>
+          <a:bodyPr lIns="0" rIns="0" tIns="0" bIns="0" anchor="ctr">
+            <a:spAutoFit/>
+          </a:bodyPr>
           <a:p>
             <a:pPr algn="ctr"/>
             <a:endParaRPr b="0" lang="en-GB" sz="4400" spc="-1" strike="noStrike">
@@ -189,7 +191,9 @@
           </a:prstGeom>
         </p:spPr>
         <p:txBody>
-          <a:bodyPr lIns="0" rIns="0" tIns="0" bIns="0" anchor="ctr"/>
+          <a:bodyPr lIns="0" rIns="0" tIns="0" bIns="0" anchor="ctr">
+            <a:spAutoFit/>
+          </a:bodyPr>
           <a:p>
             <a:pPr algn="ctr"/>
             <a:endParaRPr b="0" lang="en-GB" sz="4400" spc="-1" strike="noStrike">
@@ -360,7 +364,9 @@
           </a:prstGeom>
         </p:spPr>
         <p:txBody>
-          <a:bodyPr lIns="0" rIns="0" tIns="0" bIns="0" anchor="ctr"/>
+          <a:bodyPr lIns="0" rIns="0" tIns="0" bIns="0" anchor="ctr">
+            <a:spAutoFit/>
+          </a:bodyPr>
           <a:p>
             <a:pPr algn="ctr"/>
             <a:endParaRPr b="0" lang="en-GB" sz="4400" spc="-1" strike="noStrike">
@@ -613,7 +619,9 @@
           </a:prstGeom>
         </p:spPr>
         <p:txBody>
-          <a:bodyPr lIns="0" rIns="0" tIns="0" bIns="0" anchor="ctr"/>
+          <a:bodyPr lIns="0" rIns="0" tIns="0" bIns="0" anchor="ctr">
+            <a:spAutoFit/>
+          </a:bodyPr>
           <a:p>
             <a:pPr algn="ctr"/>
             <a:endParaRPr b="0" lang="en-GB" sz="4400" spc="-1" strike="noStrike">
@@ -642,7 +650,9 @@
           </a:prstGeom>
         </p:spPr>
         <p:txBody>
-          <a:bodyPr lIns="0" rIns="0" tIns="0" bIns="0" anchor="ctr"/>
+          <a:bodyPr lIns="0" rIns="0" tIns="0" bIns="0" anchor="ctr">
+            <a:spAutoFit/>
+          </a:bodyPr>
           <a:p>
             <a:pPr algn="ctr"/>
             <a:endParaRPr b="0" lang="en-GB" sz="3200" spc="-1" strike="noStrike">
@@ -693,7 +703,9 @@
           </a:prstGeom>
         </p:spPr>
         <p:txBody>
-          <a:bodyPr lIns="0" rIns="0" tIns="0" bIns="0" anchor="ctr"/>
+          <a:bodyPr lIns="0" rIns="0" tIns="0" bIns="0" anchor="ctr">
+            <a:spAutoFit/>
+          </a:bodyPr>
           <a:p>
             <a:pPr algn="ctr"/>
             <a:endParaRPr b="0" lang="en-GB" sz="4400" spc="-1" strike="noStrike">
@@ -774,7 +786,9 @@
           </a:prstGeom>
         </p:spPr>
         <p:txBody>
-          <a:bodyPr lIns="0" rIns="0" tIns="0" bIns="0" anchor="ctr"/>
+          <a:bodyPr lIns="0" rIns="0" tIns="0" bIns="0" anchor="ctr">
+            <a:spAutoFit/>
+          </a:bodyPr>
           <a:p>
             <a:pPr algn="ctr"/>
             <a:endParaRPr b="0" lang="en-GB" sz="4400" spc="-1" strike="noStrike">
@@ -885,7 +899,9 @@
           </a:prstGeom>
         </p:spPr>
         <p:txBody>
-          <a:bodyPr lIns="0" rIns="0" tIns="0" bIns="0" anchor="ctr"/>
+          <a:bodyPr lIns="0" rIns="0" tIns="0" bIns="0" anchor="ctr">
+            <a:spAutoFit/>
+          </a:bodyPr>
           <a:p>
             <a:pPr algn="ctr"/>
             <a:endParaRPr b="0" lang="en-GB" sz="4400" spc="-1" strike="noStrike">
@@ -936,7 +952,9 @@
           </a:prstGeom>
         </p:spPr>
         <p:txBody>
-          <a:bodyPr lIns="0" rIns="0" tIns="0" bIns="0" anchor="ctr"/>
+          <a:bodyPr lIns="0" rIns="0" tIns="0" bIns="0" anchor="ctr">
+            <a:spAutoFit/>
+          </a:bodyPr>
           <a:p>
             <a:pPr algn="ctr"/>
             <a:endParaRPr b="0" lang="en-GB" sz="3200" spc="-1" strike="noStrike">
@@ -987,7 +1005,9 @@
           </a:prstGeom>
         </p:spPr>
         <p:txBody>
-          <a:bodyPr lIns="0" rIns="0" tIns="0" bIns="0" anchor="ctr"/>
+          <a:bodyPr lIns="0" rIns="0" tIns="0" bIns="0" anchor="ctr">
+            <a:spAutoFit/>
+          </a:bodyPr>
           <a:p>
             <a:pPr algn="ctr"/>
             <a:endParaRPr b="0" lang="en-GB" sz="4400" spc="-1" strike="noStrike">
@@ -1128,7 +1148,9 @@
           </a:prstGeom>
         </p:spPr>
         <p:txBody>
-          <a:bodyPr lIns="0" rIns="0" tIns="0" bIns="0" anchor="ctr"/>
+          <a:bodyPr lIns="0" rIns="0" tIns="0" bIns="0" anchor="ctr">
+            <a:spAutoFit/>
+          </a:bodyPr>
           <a:p>
             <a:pPr algn="ctr"/>
             <a:endParaRPr b="0" lang="en-GB" sz="4400" spc="-1" strike="noStrike">
@@ -1157,7 +1179,9 @@
           </a:prstGeom>
         </p:spPr>
         <p:txBody>
-          <a:bodyPr lIns="0" rIns="0" tIns="0" bIns="0" anchor="ctr"/>
+          <a:bodyPr lIns="0" rIns="0" tIns="0" bIns="0" anchor="ctr">
+            <a:spAutoFit/>
+          </a:bodyPr>
           <a:p>
             <a:pPr algn="ctr"/>
             <a:endParaRPr b="0" lang="en-GB" sz="3200" spc="-1" strike="noStrike">
@@ -1208,7 +1232,9 @@
           </a:prstGeom>
         </p:spPr>
         <p:txBody>
-          <a:bodyPr lIns="0" rIns="0" tIns="0" bIns="0" anchor="ctr"/>
+          <a:bodyPr lIns="0" rIns="0" tIns="0" bIns="0" anchor="ctr">
+            <a:spAutoFit/>
+          </a:bodyPr>
           <a:p>
             <a:pPr algn="ctr"/>
             <a:endParaRPr b="0" lang="en-GB" sz="4400" spc="-1" strike="noStrike">
@@ -1349,7 +1375,9 @@
           </a:prstGeom>
         </p:spPr>
         <p:txBody>
-          <a:bodyPr lIns="0" rIns="0" tIns="0" bIns="0" anchor="ctr"/>
+          <a:bodyPr lIns="0" rIns="0" tIns="0" bIns="0" anchor="ctr">
+            <a:spAutoFit/>
+          </a:bodyPr>
           <a:p>
             <a:pPr algn="ctr"/>
             <a:endParaRPr b="0" lang="en-GB" sz="4400" spc="-1" strike="noStrike">
@@ -1490,7 +1518,9 @@
           </a:prstGeom>
         </p:spPr>
         <p:txBody>
-          <a:bodyPr lIns="0" rIns="0" tIns="0" bIns="0" anchor="ctr"/>
+          <a:bodyPr lIns="0" rIns="0" tIns="0" bIns="0" anchor="ctr">
+            <a:spAutoFit/>
+          </a:bodyPr>
           <a:p>
             <a:pPr algn="ctr"/>
             <a:endParaRPr b="0" lang="en-GB" sz="4400" spc="-1" strike="noStrike">
@@ -1601,7 +1631,9 @@
           </a:prstGeom>
         </p:spPr>
         <p:txBody>
-          <a:bodyPr lIns="0" rIns="0" tIns="0" bIns="0" anchor="ctr"/>
+          <a:bodyPr lIns="0" rIns="0" tIns="0" bIns="0" anchor="ctr">
+            <a:spAutoFit/>
+          </a:bodyPr>
           <a:p>
             <a:pPr algn="ctr"/>
             <a:endParaRPr b="0" lang="en-GB" sz="4400" spc="-1" strike="noStrike">
@@ -1772,7 +1804,9 @@
           </a:prstGeom>
         </p:spPr>
         <p:txBody>
-          <a:bodyPr lIns="0" rIns="0" tIns="0" bIns="0" anchor="ctr"/>
+          <a:bodyPr lIns="0" rIns="0" tIns="0" bIns="0" anchor="ctr">
+            <a:spAutoFit/>
+          </a:bodyPr>
           <a:p>
             <a:pPr algn="ctr"/>
             <a:endParaRPr b="0" lang="en-GB" sz="4400" spc="-1" strike="noStrike">
@@ -2003,7 +2037,9 @@
           </a:prstGeom>
         </p:spPr>
         <p:txBody>
-          <a:bodyPr lIns="0" rIns="0" tIns="0" bIns="0" anchor="ctr"/>
+          <a:bodyPr lIns="0" rIns="0" tIns="0" bIns="0" anchor="ctr">
+            <a:spAutoFit/>
+          </a:bodyPr>
           <a:p>
             <a:pPr algn="ctr"/>
             <a:endParaRPr b="0" lang="en-GB" sz="4400" spc="-1" strike="noStrike">
@@ -2084,7 +2120,9 @@
           </a:prstGeom>
         </p:spPr>
         <p:txBody>
-          <a:bodyPr lIns="0" rIns="0" tIns="0" bIns="0" anchor="ctr"/>
+          <a:bodyPr lIns="0" rIns="0" tIns="0" bIns="0" anchor="ctr">
+            <a:spAutoFit/>
+          </a:bodyPr>
           <a:p>
             <a:pPr algn="ctr"/>
             <a:endParaRPr b="0" lang="en-GB" sz="4400" spc="-1" strike="noStrike">
@@ -2195,7 +2233,9 @@
           </a:prstGeom>
         </p:spPr>
         <p:txBody>
-          <a:bodyPr lIns="0" rIns="0" tIns="0" bIns="0" anchor="ctr"/>
+          <a:bodyPr lIns="0" rIns="0" tIns="0" bIns="0" anchor="ctr">
+            <a:spAutoFit/>
+          </a:bodyPr>
           <a:p>
             <a:pPr algn="ctr"/>
             <a:endParaRPr b="0" lang="en-GB" sz="4400" spc="-1" strike="noStrike">
@@ -2246,7 +2286,9 @@
           </a:prstGeom>
         </p:spPr>
         <p:txBody>
-          <a:bodyPr lIns="0" rIns="0" tIns="0" bIns="0" anchor="ctr"/>
+          <a:bodyPr lIns="0" rIns="0" tIns="0" bIns="0" anchor="ctr">
+            <a:spAutoFit/>
+          </a:bodyPr>
           <a:p>
             <a:pPr algn="ctr"/>
             <a:endParaRPr b="0" lang="en-GB" sz="3200" spc="-1" strike="noStrike">
@@ -2297,7 +2339,9 @@
           </a:prstGeom>
         </p:spPr>
         <p:txBody>
-          <a:bodyPr lIns="0" rIns="0" tIns="0" bIns="0" anchor="ctr"/>
+          <a:bodyPr lIns="0" rIns="0" tIns="0" bIns="0" anchor="ctr">
+            <a:spAutoFit/>
+          </a:bodyPr>
           <a:p>
             <a:pPr algn="ctr"/>
             <a:endParaRPr b="0" lang="en-GB" sz="4400" spc="-1" strike="noStrike">
@@ -2438,7 +2482,9 @@
           </a:prstGeom>
         </p:spPr>
         <p:txBody>
-          <a:bodyPr lIns="0" rIns="0" tIns="0" bIns="0" anchor="ctr"/>
+          <a:bodyPr lIns="0" rIns="0" tIns="0" bIns="0" anchor="ctr">
+            <a:spAutoFit/>
+          </a:bodyPr>
           <a:p>
             <a:pPr algn="ctr"/>
             <a:endParaRPr b="0" lang="en-GB" sz="4400" spc="-1" strike="noStrike">
@@ -2579,7 +2625,9 @@
           </a:prstGeom>
         </p:spPr>
         <p:txBody>
-          <a:bodyPr lIns="0" rIns="0" tIns="0" bIns="0" anchor="ctr"/>
+          <a:bodyPr lIns="0" rIns="0" tIns="0" bIns="0" anchor="ctr">
+            <a:spAutoFit/>
+          </a:bodyPr>
           <a:p>
             <a:pPr algn="ctr"/>
             <a:endParaRPr b="0" lang="en-GB" sz="4400" spc="-1" strike="noStrike">
@@ -2719,15 +2767,17 @@
         </p:nvSpPr>
         <p:spPr>
           <a:xfrm>
-            <a:off x="838080" y="365040"/>
-            <a:ext cx="10514880" cy="1324800"/>
+            <a:off x="609480" y="273600"/>
+            <a:ext cx="10972080" cy="1144440"/>
           </a:xfrm>
           <a:prstGeom prst="rect">
             <a:avLst/>
           </a:prstGeom>
         </p:spPr>
         <p:txBody>
-          <a:bodyPr lIns="0" rIns="0" tIns="0" bIns="0" anchor="ctr"/>
+          <a:bodyPr lIns="0" rIns="0" tIns="0" bIns="0" anchor="ctr">
+            <a:noAutofit/>
+          </a:bodyPr>
           <a:p>
             <a:r>
               <a:rPr b="0" lang="en-GB" sz="1800" spc="-1" strike="noStrike">
@@ -2754,7 +2804,7 @@
         <p:spPr>
           <a:xfrm>
             <a:off x="609480" y="1604520"/>
-            <a:ext cx="10972440" cy="3977280"/>
+            <a:ext cx="10972080" cy="3976920"/>
           </a:xfrm>
           <a:prstGeom prst="rect">
             <a:avLst/>
@@ -2777,12 +2827,12 @@
               <a:buChar char=""/>
             </a:pPr>
             <a:r>
-              <a:rPr b="0" lang="en-GB" sz="3200" spc="-1" strike="noStrike">
+              <a:rPr b="0" lang="en-GB" sz="1800" spc="-1" strike="noStrike">
                 <a:latin typeface="Arial"/>
               </a:rPr>
               <a:t>Click to edit the outline text format</a:t>
             </a:r>
-            <a:endParaRPr b="0" lang="en-GB" sz="3200" spc="-1" strike="noStrike">
+            <a:endParaRPr b="0" lang="en-GB" sz="1800" spc="-1" strike="noStrike">
               <a:latin typeface="Arial"/>
             </a:endParaRPr>
           </a:p>
@@ -2799,12 +2849,12 @@
               <a:buChar char=""/>
             </a:pPr>
             <a:r>
-              <a:rPr b="0" lang="en-GB" sz="2800" spc="-1" strike="noStrike">
+              <a:rPr b="0" lang="en-GB" sz="1800" spc="-1" strike="noStrike">
                 <a:latin typeface="Arial"/>
               </a:rPr>
               <a:t>Second Outline Level</a:t>
             </a:r>
-            <a:endParaRPr b="0" lang="en-GB" sz="2800" spc="-1" strike="noStrike">
+            <a:endParaRPr b="0" lang="en-GB" sz="1800" spc="-1" strike="noStrike">
               <a:latin typeface="Arial"/>
             </a:endParaRPr>
           </a:p>
@@ -2821,12 +2871,12 @@
               <a:buChar char=""/>
             </a:pPr>
             <a:r>
-              <a:rPr b="0" lang="en-GB" sz="2400" spc="-1" strike="noStrike">
+              <a:rPr b="0" lang="en-GB" sz="1800" spc="-1" strike="noStrike">
                 <a:latin typeface="Arial"/>
               </a:rPr>
               <a:t>Third Outline Level</a:t>
             </a:r>
-            <a:endParaRPr b="0" lang="en-GB" sz="2400" spc="-1" strike="noStrike">
+            <a:endParaRPr b="0" lang="en-GB" sz="1800" spc="-1" strike="noStrike">
               <a:latin typeface="Arial"/>
             </a:endParaRPr>
           </a:p>
@@ -2843,12 +2893,12 @@
               <a:buChar char=""/>
             </a:pPr>
             <a:r>
-              <a:rPr b="0" lang="en-GB" sz="2000" spc="-1" strike="noStrike">
+              <a:rPr b="0" lang="en-GB" sz="1800" spc="-1" strike="noStrike">
                 <a:latin typeface="Arial"/>
               </a:rPr>
               <a:t>Fourth Outline Level</a:t>
             </a:r>
-            <a:endParaRPr b="0" lang="en-GB" sz="2000" spc="-1" strike="noStrike">
+            <a:endParaRPr b="0" lang="en-GB" sz="1800" spc="-1" strike="noStrike">
               <a:latin typeface="Arial"/>
             </a:endParaRPr>
           </a:p>
@@ -2865,12 +2915,12 @@
               <a:buChar char=""/>
             </a:pPr>
             <a:r>
-              <a:rPr b="0" lang="en-GB" sz="2000" spc="-1" strike="noStrike">
+              <a:rPr b="0" lang="en-GB" sz="1800" spc="-1" strike="noStrike">
                 <a:latin typeface="Arial"/>
               </a:rPr>
               <a:t>Fifth Outline Level</a:t>
             </a:r>
-            <a:endParaRPr b="0" lang="en-GB" sz="2000" spc="-1" strike="noStrike">
+            <a:endParaRPr b="0" lang="en-GB" sz="1800" spc="-1" strike="noStrike">
               <a:latin typeface="Arial"/>
             </a:endParaRPr>
           </a:p>
@@ -2887,12 +2937,12 @@
               <a:buChar char=""/>
             </a:pPr>
             <a:r>
-              <a:rPr b="0" lang="en-GB" sz="2000" spc="-1" strike="noStrike">
+              <a:rPr b="0" lang="en-GB" sz="1800" spc="-1" strike="noStrike">
                 <a:latin typeface="Arial"/>
               </a:rPr>
               <a:t>Sixth Outline Level</a:t>
             </a:r>
-            <a:endParaRPr b="0" lang="en-GB" sz="2000" spc="-1" strike="noStrike">
+            <a:endParaRPr b="0" lang="en-GB" sz="1800" spc="-1" strike="noStrike">
               <a:latin typeface="Arial"/>
             </a:endParaRPr>
           </a:p>
@@ -2909,12 +2959,12 @@
               <a:buChar char=""/>
             </a:pPr>
             <a:r>
-              <a:rPr b="0" lang="en-GB" sz="2000" spc="-1" strike="noStrike">
+              <a:rPr b="0" lang="en-GB" sz="1800" spc="-1" strike="noStrike">
                 <a:latin typeface="Arial"/>
               </a:rPr>
               <a:t>Seventh Outline Level</a:t>
             </a:r>
-            <a:endParaRPr b="0" lang="en-GB" sz="2000" spc="-1" strike="noStrike">
+            <a:endParaRPr b="0" lang="en-GB" sz="1800" spc="-1" strike="noStrike">
               <a:latin typeface="Arial"/>
             </a:endParaRPr>
           </a:p>
@@ -2984,56 +3034,16 @@
           </a:prstGeom>
         </p:spPr>
         <p:txBody>
-          <a:bodyPr lIns="0" rIns="0" tIns="0" bIns="0" anchor="ctr"/>
+          <a:bodyPr lIns="0" rIns="0" tIns="0" bIns="0" anchor="ctr">
+            <a:noAutofit/>
+          </a:bodyPr>
           <a:p>
             <a:pPr algn="ctr"/>
             <a:r>
               <a:rPr b="0" lang="en-GB" sz="4400" spc="-1" strike="noStrike">
                 <a:latin typeface="Arial"/>
               </a:rPr>
-              <a:t>Clic</a:t>
-            </a:r>
-            <a:r>
-              <a:rPr b="0" lang="en-GB" sz="4400" spc="-1" strike="noStrike">
-                <a:latin typeface="Arial"/>
-              </a:rPr>
-              <a:t>k to </a:t>
-            </a:r>
-            <a:r>
-              <a:rPr b="0" lang="en-GB" sz="4400" spc="-1" strike="noStrike">
-                <a:latin typeface="Arial"/>
-              </a:rPr>
-              <a:t>edit </a:t>
-            </a:r>
-            <a:r>
-              <a:rPr b="0" lang="en-GB" sz="4400" spc="-1" strike="noStrike">
-                <a:latin typeface="Arial"/>
-              </a:rPr>
-              <a:t>the </a:t>
-            </a:r>
-            <a:r>
-              <a:rPr b="0" lang="en-GB" sz="4400" spc="-1" strike="noStrike">
-                <a:latin typeface="Arial"/>
-              </a:rPr>
-              <a:t>title </a:t>
-            </a:r>
-            <a:r>
-              <a:rPr b="0" lang="en-GB" sz="4400" spc="-1" strike="noStrike">
-                <a:latin typeface="Arial"/>
-              </a:rPr>
-              <a:t>text </a:t>
-            </a:r>
-            <a:r>
-              <a:rPr b="0" lang="en-GB" sz="4400" spc="-1" strike="noStrike">
-                <a:latin typeface="Arial"/>
-              </a:rPr>
-              <a:t>for</a:t>
-            </a:r>
-            <a:r>
-              <a:rPr b="0" lang="en-GB" sz="4400" spc="-1" strike="noStrike">
-                <a:latin typeface="Arial"/>
-              </a:rPr>
-              <a:t>mat</a:t>
+              <a:t>Click to edit the title text format</a:t>
             </a:r>
             <a:endParaRPr b="0" lang="en-GB" sz="4400" spc="-1" strike="noStrike">
               <a:latin typeface="Arial"/>
@@ -3266,7 +3276,7 @@
         <p:spPr>
           <a:xfrm>
             <a:off x="276840" y="268560"/>
-            <a:ext cx="11601360" cy="6324480"/>
+            <a:ext cx="11601000" cy="6324120"/>
           </a:xfrm>
           <a:prstGeom prst="roundRect">
             <a:avLst>
@@ -3278,9 +3288,7 @@
             <a:solidFill>
               <a:srgbClr val="325490"/>
             </a:solidFill>
-            <a:custDash>
-              <a:ds d="400000" sp="300000"/>
-            </a:custDash>
+            <a:prstDash val="dash"/>
             <a:miter/>
           </a:ln>
         </p:spPr>
@@ -3300,7 +3308,7 @@
         <p:spPr>
           <a:xfrm>
             <a:off x="1688040" y="863280"/>
-            <a:ext cx="1875600" cy="1637640"/>
+            <a:ext cx="1875240" cy="1637280"/>
           </a:xfrm>
           <a:prstGeom prst="ellipse">
             <a:avLst/>
@@ -3322,7 +3330,9 @@
           <a:fontRef idx="minor"/>
         </p:style>
         <p:txBody>
-          <a:bodyPr lIns="90000" rIns="90000" tIns="45000" bIns="45000" anchor="ctr"/>
+          <a:bodyPr lIns="90000" rIns="90000" tIns="45000" bIns="45000" anchor="ctr">
+            <a:noAutofit/>
+          </a:bodyPr>
           <a:p>
             <a:pPr algn="ctr">
               <a:lnSpc>
@@ -3354,7 +3364,7 @@
         <p:spPr>
           <a:xfrm>
             <a:off x="300960" y="1312920"/>
-            <a:ext cx="483120" cy="272520"/>
+            <a:ext cx="482760" cy="272160"/>
           </a:xfrm>
           <a:prstGeom prst="rect">
             <a:avLst/>
@@ -3371,7 +3381,9 @@
           <a:fontRef idx="minor"/>
         </p:style>
         <p:txBody>
-          <a:bodyPr lIns="90000" rIns="90000" tIns="45000" bIns="45000"/>
+          <a:bodyPr lIns="90000" rIns="90000" tIns="45000" bIns="45000">
+            <a:noAutofit/>
+          </a:bodyPr>
           <a:p>
             <a:pPr>
               <a:lnSpc>
@@ -3416,7 +3428,7 @@
           </p:nvSpPr>
           <p:spPr>
             <a:xfrm>
-              <a:off x="276120" y="1375560"/>
+              <a:off x="275760" y="1375560"/>
               <a:ext cx="360" cy="612720"/>
             </a:xfrm>
             <a:prstGeom prst="line">
@@ -3502,7 +3514,7 @@
         <p:spPr>
           <a:xfrm>
             <a:off x="4467600" y="863280"/>
-            <a:ext cx="1875600" cy="1637640"/>
+            <a:ext cx="1875240" cy="1637280"/>
           </a:xfrm>
           <a:prstGeom prst="ellipse">
             <a:avLst/>
@@ -3524,7 +3536,9 @@
           <a:fontRef idx="minor"/>
         </p:style>
         <p:txBody>
-          <a:bodyPr lIns="90000" rIns="90000" tIns="45000" bIns="45000" anchor="ctr"/>
+          <a:bodyPr lIns="90000" rIns="90000" tIns="45000" bIns="45000" anchor="ctr">
+            <a:noAutofit/>
+          </a:bodyPr>
           <a:p>
             <a:pPr algn="ctr">
               <a:lnSpc>
@@ -3556,7 +3570,7 @@
         <p:spPr>
           <a:xfrm>
             <a:off x="7778160" y="863280"/>
-            <a:ext cx="1875600" cy="1637640"/>
+            <a:ext cx="1875240" cy="1637280"/>
           </a:xfrm>
           <a:prstGeom prst="ellipse">
             <a:avLst/>
@@ -3578,7 +3592,9 @@
           <a:fontRef idx="minor"/>
         </p:style>
         <p:txBody>
-          <a:bodyPr lIns="90000" rIns="90000" tIns="45000" bIns="45000" anchor="ctr"/>
+          <a:bodyPr lIns="90000" rIns="90000" tIns="45000" bIns="45000" anchor="ctr">
+            <a:noAutofit/>
+          </a:bodyPr>
           <a:p>
             <a:pPr algn="ctr">
               <a:lnSpc>
@@ -3610,7 +3626,7 @@
         <p:spPr>
           <a:xfrm>
             <a:off x="7778160" y="3250800"/>
-            <a:ext cx="1875600" cy="1637640"/>
+            <a:ext cx="1875240" cy="1637280"/>
           </a:xfrm>
           <a:prstGeom prst="ellipse">
             <a:avLst/>
@@ -3632,7 +3648,9 @@
           <a:fontRef idx="minor"/>
         </p:style>
         <p:txBody>
-          <a:bodyPr lIns="90000" rIns="90000" tIns="45000" bIns="45000" anchor="ctr"/>
+          <a:bodyPr lIns="90000" rIns="90000" tIns="45000" bIns="45000" anchor="ctr">
+            <a:noAutofit/>
+          </a:bodyPr>
           <a:p>
             <a:pPr algn="ctr">
               <a:lnSpc>
@@ -3663,8 +3681,8 @@
         </p:nvSpPr>
         <p:spPr>
           <a:xfrm flipV="1">
-            <a:off x="3564360" y="1680120"/>
-            <a:ext cx="450720" cy="360"/>
+            <a:off x="3564360" y="1679400"/>
+            <a:ext cx="450360" cy="360"/>
           </a:xfrm>
           <a:custGeom>
             <a:avLst/>
@@ -3707,7 +3725,7 @@
         <p:spPr>
           <a:xfrm>
             <a:off x="8496000" y="2384280"/>
-            <a:ext cx="439560" cy="638640"/>
+            <a:ext cx="439200" cy="638280"/>
           </a:xfrm>
           <a:prstGeom prst="rect">
             <a:avLst/>
@@ -3724,7 +3742,9 @@
           <a:fontRef idx="minor"/>
         </p:style>
         <p:txBody>
-          <a:bodyPr lIns="90000" rIns="90000" tIns="45000" bIns="45000"/>
+          <a:bodyPr lIns="90000" rIns="90000" tIns="45000" bIns="45000">
+            <a:noAutofit/>
+          </a:bodyPr>
           <a:p>
             <a:pPr>
               <a:lnSpc>
@@ -3855,7 +3875,7 @@
         <p:spPr>
           <a:xfrm flipV="1">
             <a:off x="4016160" y="1681560"/>
-            <a:ext cx="450720" cy="8280"/>
+            <a:ext cx="450360" cy="7920"/>
           </a:xfrm>
           <a:custGeom>
             <a:avLst/>
@@ -3898,7 +3918,7 @@
         <p:spPr>
           <a:xfrm>
             <a:off x="3371040" y="1093320"/>
-            <a:ext cx="1401840" cy="454320"/>
+            <a:ext cx="1401480" cy="453960"/>
           </a:xfrm>
           <a:prstGeom prst="rect">
             <a:avLst/>
@@ -3915,7 +3935,9 @@
           <a:fontRef idx="minor"/>
         </p:style>
         <p:txBody>
-          <a:bodyPr lIns="90000" rIns="90000" tIns="45000" bIns="45000"/>
+          <a:bodyPr lIns="90000" rIns="90000" tIns="45000" bIns="45000">
+            <a:noAutofit/>
+          </a:bodyPr>
           <a:p>
             <a:pPr>
               <a:lnSpc>
@@ -4046,7 +4068,7 @@
         <p:spPr>
           <a:xfrm>
             <a:off x="6343920" y="1682280"/>
-            <a:ext cx="715320" cy="394920"/>
+            <a:ext cx="714960" cy="394560"/>
           </a:xfrm>
           <a:custGeom>
             <a:avLst/>
@@ -4088,8 +4110,8 @@
         </p:nvSpPr>
         <p:spPr>
           <a:xfrm flipV="1">
-            <a:off x="7098120" y="1681560"/>
-            <a:ext cx="679320" cy="394920"/>
+            <a:off x="7098120" y="1681200"/>
+            <a:ext cx="678960" cy="394560"/>
           </a:xfrm>
           <a:custGeom>
             <a:avLst/>
@@ -4132,7 +4154,7 @@
         <p:spPr>
           <a:xfrm>
             <a:off x="7095960" y="2090880"/>
-            <a:ext cx="956160" cy="1398960"/>
+            <a:ext cx="955800" cy="1398600"/>
           </a:xfrm>
           <a:custGeom>
             <a:avLst/>
@@ -4175,7 +4197,7 @@
         <p:spPr>
           <a:xfrm>
             <a:off x="8052840" y="5244480"/>
-            <a:ext cx="1198800" cy="1046520"/>
+            <a:ext cx="1198440" cy="1046160"/>
           </a:xfrm>
           <a:prstGeom prst="ellipse">
             <a:avLst/>
@@ -4197,7 +4219,9 @@
           <a:fontRef idx="minor"/>
         </p:style>
         <p:txBody>
-          <a:bodyPr lIns="90000" rIns="90000" tIns="45000" bIns="45000" anchor="ctr"/>
+          <a:bodyPr lIns="90000" rIns="90000" tIns="45000" bIns="45000" anchor="ctr">
+            <a:noAutofit/>
+          </a:bodyPr>
           <a:p>
             <a:pPr algn="ctr">
               <a:lnSpc>
@@ -4229,7 +4253,7 @@
         <p:spPr>
           <a:xfrm>
             <a:off x="6618240" y="1414080"/>
-            <a:ext cx="986400" cy="454320"/>
+            <a:ext cx="986040" cy="453960"/>
           </a:xfrm>
           <a:prstGeom prst="rect">
             <a:avLst/>
@@ -4246,7 +4270,9 @@
           <a:fontRef idx="minor"/>
         </p:style>
         <p:txBody>
-          <a:bodyPr lIns="90000" rIns="90000" tIns="45000" bIns="45000"/>
+          <a:bodyPr lIns="90000" rIns="90000" tIns="45000" bIns="45000">
+            <a:noAutofit/>
+          </a:bodyPr>
           <a:p>
             <a:pPr>
               <a:lnSpc>
@@ -4377,7 +4403,7 @@
         <p:spPr>
           <a:xfrm>
             <a:off x="9654480" y="1682280"/>
-            <a:ext cx="2207160" cy="1261440"/>
+            <a:ext cx="2206800" cy="1261080"/>
           </a:xfrm>
           <a:custGeom>
             <a:avLst/>
@@ -4420,8 +4446,8 @@
         </p:nvSpPr>
         <p:spPr>
           <a:xfrm flipV="1">
-            <a:off x="9654480" y="2943000"/>
-            <a:ext cx="2207160" cy="1124640"/>
+            <a:off x="9654480" y="2941920"/>
+            <a:ext cx="2206800" cy="1124280"/>
           </a:xfrm>
           <a:custGeom>
             <a:avLst/>
@@ -4465,7 +4491,7 @@
         <p:spPr>
           <a:xfrm>
             <a:off x="7437960" y="5767920"/>
-            <a:ext cx="614160" cy="360"/>
+            <a:ext cx="613800" cy="360"/>
           </a:xfrm>
           <a:custGeom>
             <a:avLst/>
@@ -4508,7 +4534,7 @@
         <p:spPr>
           <a:xfrm>
             <a:off x="7059960" y="5146920"/>
-            <a:ext cx="986400" cy="272520"/>
+            <a:ext cx="986040" cy="272160"/>
           </a:xfrm>
           <a:prstGeom prst="rect">
             <a:avLst/>
@@ -4525,7 +4551,9 @@
           <a:fontRef idx="minor"/>
         </p:style>
         <p:txBody>
-          <a:bodyPr lIns="90000" rIns="90000" tIns="45000" bIns="45000"/>
+          <a:bodyPr lIns="90000" rIns="90000" tIns="45000" bIns="45000">
+            <a:noAutofit/>
+          </a:bodyPr>
           <a:p>
             <a:pPr>
               <a:lnSpc>
@@ -4556,10 +4584,10 @@
         </p:nvGrpSpPr>
         <p:grpSpPr>
           <a:xfrm>
-            <a:off x="7219440" y="5443200"/>
-            <a:ext cx="403920" cy="612720"/>
-            <a:chOff x="7219440" y="5443200"/>
-            <a:chExt cx="403920" cy="612720"/>
+            <a:off x="7219440" y="5442840"/>
+            <a:ext cx="403560" cy="612720"/>
+            <a:chOff x="7219440" y="5442840"/>
+            <a:chExt cx="403560" cy="612720"/>
           </a:xfrm>
         </p:grpSpPr>
         <p:grpSp>
@@ -4570,9 +4598,9 @@
           </p:nvGrpSpPr>
           <p:grpSpPr>
             <a:xfrm>
-              <a:off x="7219440" y="5443200"/>
+              <a:off x="7219440" y="5442840"/>
               <a:ext cx="354600" cy="612720"/>
-              <a:chOff x="7219440" y="5443200"/>
+              <a:chOff x="7219440" y="5442840"/>
               <a:chExt cx="354600" cy="612720"/>
             </a:xfrm>
           </p:grpSpPr>
@@ -4584,7 +4612,7 @@
             </p:nvSpPr>
             <p:spPr>
               <a:xfrm>
-                <a:off x="7396920" y="5443200"/>
+                <a:off x="7396920" y="5442840"/>
                 <a:ext cx="360" cy="612360"/>
               </a:xfrm>
               <a:prstGeom prst="line">
@@ -4612,7 +4640,7 @@
             </p:nvSpPr>
             <p:spPr>
               <a:xfrm>
-                <a:off x="7219440" y="5443200"/>
+                <a:off x="7219440" y="5442840"/>
                 <a:ext cx="354600" cy="360"/>
               </a:xfrm>
               <a:prstGeom prst="line">
@@ -4640,7 +4668,7 @@
             </p:nvSpPr>
             <p:spPr>
               <a:xfrm>
-                <a:off x="7219440" y="6055560"/>
+                <a:off x="7219440" y="6055200"/>
                 <a:ext cx="354600" cy="360"/>
               </a:xfrm>
               <a:prstGeom prst="line">
@@ -4670,7 +4698,7 @@
           <p:spPr>
             <a:xfrm>
               <a:off x="7318440" y="5649840"/>
-              <a:ext cx="304920" cy="276120"/>
+              <a:ext cx="304560" cy="275760"/>
             </a:xfrm>
             <a:prstGeom prst="rect">
               <a:avLst/>
@@ -4696,8 +4724,8 @@
         </p:nvSpPr>
         <p:spPr>
           <a:xfrm flipV="1" rot="10800000">
-            <a:off x="8237520" y="7505280"/>
-            <a:ext cx="459000" cy="1717560"/>
+            <a:off x="8696520" y="9222840"/>
+            <a:ext cx="458640" cy="1717200"/>
           </a:xfrm>
           <a:prstGeom prst="curvedConnector3">
             <a:avLst>
@@ -4728,8 +4756,8 @@
         </p:nvSpPr>
         <p:spPr>
           <a:xfrm rot="5400000">
-            <a:off x="5923080" y="3657600"/>
-            <a:ext cx="3525840" cy="733680"/>
+            <a:off x="5923440" y="3657600"/>
+            <a:ext cx="3525480" cy="733320"/>
           </a:xfrm>
           <a:prstGeom prst="curvedConnector4">
             <a:avLst>
@@ -4761,8 +4789,8 @@
         </p:nvSpPr>
         <p:spPr>
           <a:xfrm flipH="1" rot="16200000">
-            <a:off x="4929840" y="3400200"/>
-            <a:ext cx="3525840" cy="1248480"/>
+            <a:off x="4929480" y="3400200"/>
+            <a:ext cx="3525480" cy="1248120"/>
           </a:xfrm>
           <a:prstGeom prst="curvedConnector2">
             <a:avLst/>
@@ -4792,7 +4820,7 @@
         <p:spPr>
           <a:xfrm>
             <a:off x="808920" y="4604760"/>
-            <a:ext cx="1875600" cy="1637640"/>
+            <a:ext cx="1875240" cy="1637280"/>
           </a:xfrm>
           <a:prstGeom prst="ellipse">
             <a:avLst/>
@@ -4814,7 +4842,9 @@
           <a:fontRef idx="minor"/>
         </p:style>
         <p:txBody>
-          <a:bodyPr lIns="90000" rIns="90000" tIns="45000" bIns="45000" anchor="ctr"/>
+          <a:bodyPr lIns="90000" rIns="90000" tIns="45000" bIns="45000" anchor="ctr">
+            <a:noAutofit/>
+          </a:bodyPr>
           <a:p>
             <a:pPr algn="ctr">
               <a:lnSpc>
@@ -4846,7 +4876,7 @@
         <p:spPr>
           <a:xfrm>
             <a:off x="2924640" y="3030480"/>
-            <a:ext cx="1875600" cy="1637640"/>
+            <a:ext cx="1875240" cy="1637280"/>
           </a:xfrm>
           <a:prstGeom prst="ellipse">
             <a:avLst/>
@@ -4868,7 +4898,9 @@
           <a:fontRef idx="minor"/>
         </p:style>
         <p:txBody>
-          <a:bodyPr lIns="90000" rIns="90000" tIns="45000" bIns="45000" anchor="ctr"/>
+          <a:bodyPr lIns="90000" rIns="90000" tIns="45000" bIns="45000" anchor="ctr">
+            <a:noAutofit/>
+          </a:bodyPr>
           <a:p>
             <a:pPr algn="ctr">
               <a:lnSpc>
@@ -4900,7 +4932,7 @@
         <p:spPr>
           <a:xfrm>
             <a:off x="11152080" y="2759760"/>
-            <a:ext cx="806400" cy="272520"/>
+            <a:ext cx="806040" cy="272160"/>
           </a:xfrm>
           <a:prstGeom prst="rect">
             <a:avLst/>
@@ -4917,7 +4949,9 @@
           <a:fontRef idx="minor"/>
         </p:style>
         <p:txBody>
-          <a:bodyPr lIns="90000" rIns="90000" tIns="45000" bIns="45000"/>
+          <a:bodyPr lIns="90000" rIns="90000" tIns="45000" bIns="45000">
+            <a:noAutofit/>
+          </a:bodyPr>
           <a:p>
             <a:pPr>
               <a:lnSpc>
@@ -4949,7 +4983,7 @@
         <p:spPr>
           <a:xfrm>
             <a:off x="276840" y="1682280"/>
-            <a:ext cx="1410480" cy="360"/>
+            <a:ext cx="1410120" cy="360"/>
           </a:xfrm>
           <a:custGeom>
             <a:avLst/>
@@ -4992,7 +5026,7 @@
         <p:spPr>
           <a:xfrm>
             <a:off x="5023440" y="3477240"/>
-            <a:ext cx="1072080" cy="454320"/>
+            <a:ext cx="1071720" cy="453960"/>
           </a:xfrm>
           <a:prstGeom prst="rect">
             <a:avLst/>
@@ -5009,7 +5043,9 @@
           <a:fontRef idx="minor"/>
         </p:style>
         <p:txBody>
-          <a:bodyPr lIns="90000" rIns="90000" tIns="45000" bIns="45000"/>
+          <a:bodyPr lIns="90000" rIns="90000" tIns="45000" bIns="45000">
+            <a:noAutofit/>
+          </a:bodyPr>
           <a:p>
             <a:pPr>
               <a:lnSpc>
@@ -5041,7 +5077,7 @@
         <p:spPr>
           <a:xfrm>
             <a:off x="3698640" y="2304360"/>
-            <a:ext cx="1320120" cy="454320"/>
+            <a:ext cx="1319760" cy="453960"/>
           </a:xfrm>
           <a:prstGeom prst="rect">
             <a:avLst/>
@@ -5058,7 +5094,9 @@
           <a:fontRef idx="minor"/>
         </p:style>
         <p:txBody>
-          <a:bodyPr lIns="90000" rIns="90000" tIns="45000" bIns="45000"/>
+          <a:bodyPr lIns="90000" rIns="90000" tIns="45000" bIns="45000">
+            <a:noAutofit/>
+          </a:bodyPr>
           <a:p>
             <a:pPr>
               <a:lnSpc>
@@ -5103,7 +5141,7 @@
           </p:nvSpPr>
           <p:spPr>
             <a:xfrm flipV="1">
-              <a:off x="276120" y="2229480"/>
+              <a:off x="275760" y="2229480"/>
               <a:ext cx="360" cy="612360"/>
             </a:xfrm>
             <a:prstGeom prst="line">
@@ -5189,7 +5227,7 @@
         <p:spPr>
           <a:xfrm>
             <a:off x="332640" y="2283120"/>
-            <a:ext cx="451440" cy="272520"/>
+            <a:ext cx="451080" cy="272160"/>
           </a:xfrm>
           <a:prstGeom prst="rect">
             <a:avLst/>
@@ -5206,7 +5244,9 @@
           <a:fontRef idx="minor"/>
         </p:style>
         <p:txBody>
-          <a:bodyPr lIns="90000" rIns="90000" tIns="45000" bIns="45000"/>
+          <a:bodyPr lIns="90000" rIns="90000" tIns="45000" bIns="45000">
+            <a:noAutofit/>
+          </a:bodyPr>
           <a:p>
             <a:pPr>
               <a:lnSpc>
@@ -5237,8 +5277,8 @@
         </p:nvSpPr>
         <p:spPr>
           <a:xfrm flipV="1">
-            <a:off x="276840" y="2260800"/>
-            <a:ext cx="1685160" cy="376200"/>
+            <a:off x="276840" y="2260440"/>
+            <a:ext cx="1684800" cy="375840"/>
           </a:xfrm>
           <a:custGeom>
             <a:avLst/>
@@ -5282,7 +5322,7 @@
         <p:spPr>
           <a:xfrm flipH="1" flipV="1">
             <a:off x="4800240" y="3849120"/>
-            <a:ext cx="640440" cy="265320"/>
+            <a:ext cx="640080" cy="264960"/>
           </a:xfrm>
           <a:custGeom>
             <a:avLst/>
@@ -5325,9 +5365,9 @@
         <p:grpSpPr>
           <a:xfrm>
             <a:off x="2588040" y="4345920"/>
-            <a:ext cx="403920" cy="612720"/>
+            <a:ext cx="403560" cy="612720"/>
             <a:chOff x="2588040" y="4345920"/>
-            <a:chExt cx="403920" cy="612720"/>
+            <a:chExt cx="403560" cy="612720"/>
           </a:xfrm>
         </p:grpSpPr>
         <p:grpSp>
@@ -5438,7 +5478,7 @@
           <p:spPr>
             <a:xfrm>
               <a:off x="2687040" y="4551840"/>
-              <a:ext cx="304920" cy="276120"/>
+              <a:ext cx="304560" cy="275760"/>
             </a:xfrm>
             <a:prstGeom prst="rect">
               <a:avLst/>
@@ -5465,9 +5505,9 @@
         <p:grpSpPr>
           <a:xfrm>
             <a:off x="5343120" y="3771000"/>
-            <a:ext cx="403920" cy="612720"/>
+            <a:ext cx="403560" cy="612720"/>
             <a:chOff x="5343120" y="3771000"/>
-            <a:chExt cx="403920" cy="612720"/>
+            <a:chExt cx="403560" cy="612720"/>
           </a:xfrm>
         </p:grpSpPr>
         <p:grpSp>
@@ -5578,7 +5618,7 @@
           <p:spPr>
             <a:xfrm>
               <a:off x="5442120" y="3977280"/>
-              <a:ext cx="304920" cy="276120"/>
+              <a:ext cx="304560" cy="275760"/>
             </a:xfrm>
             <a:prstGeom prst="rect">
               <a:avLst/>
@@ -5605,9 +5645,9 @@
         <p:grpSpPr>
           <a:xfrm>
             <a:off x="4570920" y="2522880"/>
-            <a:ext cx="404280" cy="612720"/>
+            <a:ext cx="403920" cy="612720"/>
             <a:chOff x="4570920" y="2522880"/>
-            <a:chExt cx="404280" cy="612720"/>
+            <a:chExt cx="403920" cy="612720"/>
           </a:xfrm>
         </p:grpSpPr>
         <p:grpSp>
@@ -5718,7 +5758,7 @@
           <p:spPr>
             <a:xfrm>
               <a:off x="4670280" y="2729520"/>
-              <a:ext cx="304920" cy="276120"/>
+              <a:ext cx="304560" cy="275760"/>
             </a:xfrm>
             <a:prstGeom prst="rect">
               <a:avLst/>
@@ -5744,8 +5784,8 @@
         </p:nvSpPr>
         <p:spPr>
           <a:xfrm rot="5400000">
-            <a:off x="5001120" y="2324160"/>
-            <a:ext cx="227160" cy="581760"/>
+            <a:off x="5001480" y="2324160"/>
+            <a:ext cx="226800" cy="581400"/>
           </a:xfrm>
           <a:prstGeom prst="curvedConnector3">
             <a:avLst>
@@ -5776,8 +5816,8 @@
         </p:nvSpPr>
         <p:spPr>
           <a:xfrm flipV="1" rot="10800000">
-            <a:off x="5477400" y="3191400"/>
-            <a:ext cx="806760" cy="162000"/>
+            <a:off x="6284160" y="3352680"/>
+            <a:ext cx="806400" cy="161640"/>
           </a:xfrm>
           <a:prstGeom prst="curvedConnector2">
             <a:avLst/>
@@ -5806,8 +5846,8 @@
         </p:nvSpPr>
         <p:spPr>
           <a:xfrm rot="5400000">
-            <a:off x="2965680" y="4456080"/>
-            <a:ext cx="260640" cy="206280"/>
+            <a:off x="2966040" y="4456080"/>
+            <a:ext cx="260280" cy="205920"/>
           </a:xfrm>
           <a:prstGeom prst="curvedConnector2">
             <a:avLst/>
@@ -5836,8 +5876,8 @@
         </p:nvSpPr>
         <p:spPr>
           <a:xfrm rot="10800000">
-            <a:off x="3626280" y="4775760"/>
-            <a:ext cx="938880" cy="84960"/>
+            <a:off x="3626640" y="4776120"/>
+            <a:ext cx="938520" cy="84600"/>
           </a:xfrm>
           <a:prstGeom prst="curvedConnector4">
             <a:avLst>
@@ -5870,7 +5910,7 @@
         <p:spPr>
           <a:xfrm>
             <a:off x="2312280" y="4057200"/>
-            <a:ext cx="745560" cy="454320"/>
+            <a:ext cx="745200" cy="453960"/>
           </a:xfrm>
           <a:prstGeom prst="rect">
             <a:avLst/>
@@ -5887,7 +5927,9 @@
           <a:fontRef idx="minor"/>
         </p:style>
         <p:txBody>
-          <a:bodyPr lIns="90000" rIns="90000" tIns="45000" bIns="45000"/>
+          <a:bodyPr lIns="90000" rIns="90000" tIns="45000" bIns="45000">
+            <a:noAutofit/>
+          </a:bodyPr>
           <a:p>
             <a:pPr>
               <a:lnSpc>
@@ -5918,8 +5960,8 @@
         </p:nvSpPr>
         <p:spPr>
           <a:xfrm flipH="1" rot="16200000">
-            <a:off x="5241960" y="3712320"/>
-            <a:ext cx="1358280" cy="2791440"/>
+            <a:off x="5241600" y="3712320"/>
+            <a:ext cx="1357920" cy="2791080"/>
           </a:xfrm>
           <a:prstGeom prst="curvedConnector2">
             <a:avLst/>
@@ -5949,7 +5991,7 @@
         <p:spPr>
           <a:xfrm>
             <a:off x="2685600" y="5424120"/>
-            <a:ext cx="4632120" cy="363600"/>
+            <a:ext cx="4631760" cy="363240"/>
           </a:xfrm>
           <a:prstGeom prst="curvedConnector3">
             <a:avLst>
@@ -5980,8 +6022,8 @@
         </p:nvSpPr>
         <p:spPr>
           <a:xfrm flipH="1" rot="16200000">
-            <a:off x="1714320" y="3412800"/>
-            <a:ext cx="2188080" cy="365760"/>
+            <a:off x="1713960" y="3412800"/>
+            <a:ext cx="2187720" cy="365400"/>
           </a:xfrm>
           <a:prstGeom prst="curvedConnector4">
             <a:avLst>
@@ -6014,7 +6056,7 @@
         <p:spPr>
           <a:xfrm>
             <a:off x="248040" y="4718520"/>
-            <a:ext cx="868680" cy="454320"/>
+            <a:ext cx="868320" cy="453960"/>
           </a:xfrm>
           <a:prstGeom prst="rect">
             <a:avLst/>
@@ -6031,7 +6073,9 @@
           <a:fontRef idx="minor"/>
         </p:style>
         <p:txBody>
-          <a:bodyPr lIns="90000" rIns="90000" tIns="45000" bIns="45000"/>
+          <a:bodyPr lIns="90000" rIns="90000" tIns="45000" bIns="45000">
+            <a:noAutofit/>
+          </a:bodyPr>
           <a:p>
             <a:pPr>
               <a:lnSpc>
@@ -6062,8 +6106,8 @@
         </p:nvSpPr>
         <p:spPr>
           <a:xfrm rot="10800000">
-            <a:off x="1257840" y="5524200"/>
-            <a:ext cx="448560" cy="99720"/>
+            <a:off x="1258200" y="5524560"/>
+            <a:ext cx="448200" cy="99360"/>
           </a:xfrm>
           <a:prstGeom prst="curvedConnector3">
             <a:avLst>
@@ -6094,8 +6138,8 @@
         </p:nvSpPr>
         <p:spPr>
           <a:xfrm rot="5400000">
-            <a:off x="5973840" y="2035440"/>
-            <a:ext cx="1853640" cy="2304360"/>
+            <a:off x="5974200" y="2035080"/>
+            <a:ext cx="1853280" cy="2304000"/>
           </a:xfrm>
           <a:prstGeom prst="curvedConnector2">
             <a:avLst/>
@@ -6124,8 +6168,8 @@
         </p:nvSpPr>
         <p:spPr>
           <a:xfrm flipV="1" rot="10800000">
-            <a:off x="9808200" y="4160520"/>
-            <a:ext cx="2029680" cy="45000"/>
+            <a:off x="11837880" y="4205520"/>
+            <a:ext cx="2029320" cy="44640"/>
           </a:xfrm>
           <a:prstGeom prst="curvedConnector3">
             <a:avLst>
@@ -6156,8 +6200,8 @@
         </p:nvSpPr>
         <p:spPr>
           <a:xfrm flipH="1" rot="5400000">
-            <a:off x="6632640" y="3230280"/>
-            <a:ext cx="532800" cy="2304360"/>
+            <a:off x="6632640" y="3230640"/>
+            <a:ext cx="532440" cy="2304000"/>
           </a:xfrm>
           <a:prstGeom prst="curvedConnector4">
             <a:avLst>
@@ -6190,7 +6234,7 @@
         <p:spPr>
           <a:xfrm>
             <a:off x="7318440" y="588960"/>
-            <a:ext cx="2827080" cy="4509360"/>
+            <a:ext cx="2826720" cy="4509000"/>
           </a:xfrm>
           <a:prstGeom prst="ellipse">
             <a:avLst/>
@@ -6319,33 +6363,6 @@
       <p:transition spd="slow"/>
     </mc:Fallback>
   </mc:AlternateContent>
-  <p:timing>
-    <p:tnLst>
-      <p:par>
-        <p:cTn id="1" dur="indefinite" restart="never" nodeType="tmRoot">
-          <p:childTnLst>
-            <p:seq>
-              <p:cTn id="2" dur="indefinite" nodeType="mainSeq"/>
-              <p:prevCondLst>
-                <p:cond delay="0" evt="onPrev">
-                  <p:tgtEl>
-                    <p:sldTgt/>
-                  </p:tgtEl>
-                </p:cond>
-              </p:prevCondLst>
-              <p:nextCondLst>
-                <p:cond delay="0" evt="onNext">
-                  <p:tgtEl>
-                    <p:sldTgt/>
-                  </p:tgtEl>
-                </p:cond>
-              </p:nextCondLst>
-            </p:seq>
-          </p:childTnLst>
-        </p:cTn>
-      </p:par>
-    </p:tnLst>
-  </p:timing>
 </p:sld>
 </file>
 
@@ -6375,7 +6392,7 @@
         <p:spPr>
           <a:xfrm>
             <a:off x="276840" y="268560"/>
-            <a:ext cx="11601360" cy="6324480"/>
+            <a:ext cx="11601000" cy="6324120"/>
           </a:xfrm>
           <a:prstGeom prst="roundRect">
             <a:avLst>
@@ -6387,9 +6404,7 @@
             <a:solidFill>
               <a:srgbClr val="325490"/>
             </a:solidFill>
-            <a:custDash>
-              <a:ds d="400000" sp="300000"/>
-            </a:custDash>
+            <a:prstDash val="dash"/>
             <a:miter/>
           </a:ln>
         </p:spPr>
@@ -6409,7 +6424,7 @@
         <p:spPr>
           <a:xfrm>
             <a:off x="576000" y="1008000"/>
-            <a:ext cx="983520" cy="373680"/>
+            <a:ext cx="983160" cy="373320"/>
           </a:xfrm>
           <a:prstGeom prst="rect">
             <a:avLst/>
@@ -6426,7 +6441,9 @@
           <a:fontRef idx="minor"/>
         </p:style>
         <p:txBody>
-          <a:bodyPr lIns="90000" rIns="90000" tIns="45000" bIns="45000"/>
+          <a:bodyPr lIns="90000" rIns="90000" tIns="45000" bIns="45000">
+            <a:noAutofit/>
+          </a:bodyPr>
           <a:p>
             <a:pPr>
               <a:lnSpc>
@@ -6458,7 +6475,7 @@
         <p:spPr>
           <a:xfrm>
             <a:off x="7778160" y="863280"/>
-            <a:ext cx="1875600" cy="1637640"/>
+            <a:ext cx="1875240" cy="1637280"/>
           </a:xfrm>
           <a:prstGeom prst="ellipse">
             <a:avLst/>
@@ -6480,7 +6497,9 @@
           <a:fontRef idx="minor"/>
         </p:style>
         <p:txBody>
-          <a:bodyPr lIns="90000" rIns="90000" tIns="45000" bIns="45000" anchor="ctr"/>
+          <a:bodyPr lIns="90000" rIns="90000" tIns="45000" bIns="45000" anchor="ctr">
+            <a:noAutofit/>
+          </a:bodyPr>
           <a:p>
             <a:pPr algn="ctr">
               <a:lnSpc>
@@ -6512,7 +6531,7 @@
         <p:spPr>
           <a:xfrm>
             <a:off x="7778160" y="3250800"/>
-            <a:ext cx="1875600" cy="1637640"/>
+            <a:ext cx="1875240" cy="1637280"/>
           </a:xfrm>
           <a:prstGeom prst="ellipse">
             <a:avLst/>
@@ -6534,7 +6553,9 @@
           <a:fontRef idx="minor"/>
         </p:style>
         <p:txBody>
-          <a:bodyPr lIns="90000" rIns="90000" tIns="45000" bIns="45000" anchor="ctr"/>
+          <a:bodyPr lIns="90000" rIns="90000" tIns="45000" bIns="45000" anchor="ctr">
+            <a:noAutofit/>
+          </a:bodyPr>
           <a:p>
             <a:pPr algn="ctr">
               <a:lnSpc>
@@ -6566,7 +6587,7 @@
         <p:spPr>
           <a:xfrm>
             <a:off x="8496000" y="2384280"/>
-            <a:ext cx="439560" cy="638640"/>
+            <a:ext cx="439200" cy="638280"/>
           </a:xfrm>
           <a:prstGeom prst="rect">
             <a:avLst/>
@@ -6583,7 +6604,9 @@
           <a:fontRef idx="minor"/>
         </p:style>
         <p:txBody>
-          <a:bodyPr lIns="90000" rIns="90000" tIns="45000" bIns="45000"/>
+          <a:bodyPr lIns="90000" rIns="90000" tIns="45000" bIns="45000">
+            <a:noAutofit/>
+          </a:bodyPr>
           <a:p>
             <a:pPr>
               <a:lnSpc>
@@ -6714,7 +6737,7 @@
         <p:spPr>
           <a:xfrm>
             <a:off x="8052840" y="5184000"/>
-            <a:ext cx="1450800" cy="1107000"/>
+            <a:ext cx="1450440" cy="1106640"/>
           </a:xfrm>
           <a:prstGeom prst="ellipse">
             <a:avLst/>
@@ -6736,7 +6759,9 @@
           <a:fontRef idx="minor"/>
         </p:style>
         <p:txBody>
-          <a:bodyPr lIns="90000" rIns="90000" tIns="45000" bIns="45000" anchor="ctr"/>
+          <a:bodyPr lIns="90000" rIns="90000" tIns="45000" bIns="45000" anchor="ctr">
+            <a:noAutofit/>
+          </a:bodyPr>
           <a:p>
             <a:pPr algn="ctr">
               <a:lnSpc>
@@ -6768,7 +6793,7 @@
         <p:spPr>
           <a:xfrm>
             <a:off x="6573240" y="1345320"/>
-            <a:ext cx="986400" cy="454320"/>
+            <a:ext cx="986040" cy="453960"/>
           </a:xfrm>
           <a:prstGeom prst="rect">
             <a:avLst/>
@@ -6785,7 +6810,9 @@
           <a:fontRef idx="minor"/>
         </p:style>
         <p:txBody>
-          <a:bodyPr lIns="90000" rIns="90000" tIns="45000" bIns="45000"/>
+          <a:bodyPr lIns="90000" rIns="90000" tIns="45000" bIns="45000">
+            <a:noAutofit/>
+          </a:bodyPr>
           <a:p>
             <a:pPr>
               <a:lnSpc>
@@ -6916,7 +6943,7 @@
         <p:spPr>
           <a:xfrm>
             <a:off x="7059960" y="5146920"/>
-            <a:ext cx="986400" cy="272520"/>
+            <a:ext cx="986040" cy="272160"/>
           </a:xfrm>
           <a:prstGeom prst="rect">
             <a:avLst/>
@@ -6933,7 +6960,9 @@
           <a:fontRef idx="minor"/>
         </p:style>
         <p:txBody>
-          <a:bodyPr lIns="90000" rIns="90000" tIns="45000" bIns="45000"/>
+          <a:bodyPr lIns="90000" rIns="90000" tIns="45000" bIns="45000">
+            <a:noAutofit/>
+          </a:bodyPr>
           <a:p>
             <a:pPr>
               <a:lnSpc>
@@ -6964,10 +6993,10 @@
         </p:nvGrpSpPr>
         <p:grpSpPr>
           <a:xfrm>
-            <a:off x="7219440" y="5443200"/>
-            <a:ext cx="403920" cy="612720"/>
-            <a:chOff x="7219440" y="5443200"/>
-            <a:chExt cx="403920" cy="612720"/>
+            <a:off x="7219440" y="5442840"/>
+            <a:ext cx="403560" cy="612720"/>
+            <a:chOff x="7219440" y="5442840"/>
+            <a:chExt cx="403560" cy="612720"/>
           </a:xfrm>
         </p:grpSpPr>
         <p:grpSp>
@@ -6978,9 +7007,9 @@
           </p:nvGrpSpPr>
           <p:grpSpPr>
             <a:xfrm>
-              <a:off x="7219440" y="5443200"/>
+              <a:off x="7219440" y="5442840"/>
               <a:ext cx="354600" cy="612720"/>
-              <a:chOff x="7219440" y="5443200"/>
+              <a:chOff x="7219440" y="5442840"/>
               <a:chExt cx="354600" cy="612720"/>
             </a:xfrm>
           </p:grpSpPr>
@@ -6992,7 +7021,7 @@
             </p:nvSpPr>
             <p:spPr>
               <a:xfrm>
-                <a:off x="7396920" y="5443200"/>
+                <a:off x="7396920" y="5442840"/>
                 <a:ext cx="360" cy="612360"/>
               </a:xfrm>
               <a:prstGeom prst="line">
@@ -7020,7 +7049,7 @@
             </p:nvSpPr>
             <p:spPr>
               <a:xfrm>
-                <a:off x="7219440" y="5443200"/>
+                <a:off x="7219440" y="5442840"/>
                 <a:ext cx="354600" cy="360"/>
               </a:xfrm>
               <a:prstGeom prst="line">
@@ -7048,7 +7077,7 @@
             </p:nvSpPr>
             <p:spPr>
               <a:xfrm>
-                <a:off x="7219440" y="6055560"/>
+                <a:off x="7219440" y="6055200"/>
                 <a:ext cx="354600" cy="360"/>
               </a:xfrm>
               <a:prstGeom prst="line">
@@ -7078,7 +7107,7 @@
           <p:spPr>
             <a:xfrm>
               <a:off x="7318440" y="5649840"/>
-              <a:ext cx="304920" cy="276120"/>
+              <a:ext cx="304560" cy="275760"/>
             </a:xfrm>
             <a:prstGeom prst="rect">
               <a:avLst/>
@@ -7105,7 +7134,7 @@
         <p:spPr>
           <a:xfrm>
             <a:off x="808920" y="4604760"/>
-            <a:ext cx="1875600" cy="1637640"/>
+            <a:ext cx="1875240" cy="1637280"/>
           </a:xfrm>
           <a:prstGeom prst="ellipse">
             <a:avLst/>
@@ -7127,7 +7156,9 @@
           <a:fontRef idx="minor"/>
         </p:style>
         <p:txBody>
-          <a:bodyPr lIns="90000" rIns="90000" tIns="45000" bIns="45000" anchor="ctr"/>
+          <a:bodyPr lIns="90000" rIns="90000" tIns="45000" bIns="45000" anchor="ctr">
+            <a:noAutofit/>
+          </a:bodyPr>
           <a:p>
             <a:pPr algn="ctr">
               <a:lnSpc>
@@ -7159,7 +7190,7 @@
         <p:spPr>
           <a:xfrm>
             <a:off x="2924640" y="3030480"/>
-            <a:ext cx="1875600" cy="1637640"/>
+            <a:ext cx="1875240" cy="1637280"/>
           </a:xfrm>
           <a:prstGeom prst="ellipse">
             <a:avLst/>
@@ -7181,7 +7212,9 @@
           <a:fontRef idx="minor"/>
         </p:style>
         <p:txBody>
-          <a:bodyPr lIns="90000" rIns="90000" tIns="45000" bIns="45000" anchor="ctr"/>
+          <a:bodyPr lIns="90000" rIns="90000" tIns="45000" bIns="45000" anchor="ctr">
+            <a:noAutofit/>
+          </a:bodyPr>
           <a:p>
             <a:pPr algn="ctr">
               <a:lnSpc>
@@ -7213,7 +7246,7 @@
         <p:spPr>
           <a:xfrm>
             <a:off x="10847880" y="2679480"/>
-            <a:ext cx="1014480" cy="272520"/>
+            <a:ext cx="1014120" cy="272160"/>
           </a:xfrm>
           <a:prstGeom prst="rect">
             <a:avLst/>
@@ -7230,7 +7263,9 @@
           <a:fontRef idx="minor"/>
         </p:style>
         <p:txBody>
-          <a:bodyPr lIns="90000" rIns="90000" tIns="45000" bIns="45000"/>
+          <a:bodyPr lIns="90000" rIns="90000" tIns="45000" bIns="45000">
+            <a:noAutofit/>
+          </a:bodyPr>
           <a:p>
             <a:pPr>
               <a:lnSpc>
@@ -7262,7 +7297,7 @@
         <p:spPr>
           <a:xfrm>
             <a:off x="5040000" y="3361320"/>
-            <a:ext cx="1072080" cy="454320"/>
+            <a:ext cx="1071720" cy="453960"/>
           </a:xfrm>
           <a:prstGeom prst="rect">
             <a:avLst/>
@@ -7279,7 +7314,9 @@
           <a:fontRef idx="minor"/>
         </p:style>
         <p:txBody>
-          <a:bodyPr lIns="90000" rIns="90000" tIns="45000" bIns="45000"/>
+          <a:bodyPr lIns="90000" rIns="90000" tIns="45000" bIns="45000">
+            <a:noAutofit/>
+          </a:bodyPr>
           <a:p>
             <a:pPr>
               <a:lnSpc>
@@ -7311,7 +7348,7 @@
         <p:spPr>
           <a:xfrm>
             <a:off x="3698640" y="2304360"/>
-            <a:ext cx="1320120" cy="454320"/>
+            <a:ext cx="1319760" cy="453960"/>
           </a:xfrm>
           <a:prstGeom prst="rect">
             <a:avLst/>
@@ -7328,7 +7365,9 @@
           <a:fontRef idx="minor"/>
         </p:style>
         <p:txBody>
-          <a:bodyPr lIns="90000" rIns="90000" tIns="45000" bIns="45000"/>
+          <a:bodyPr lIns="90000" rIns="90000" tIns="45000" bIns="45000">
+            <a:noAutofit/>
+          </a:bodyPr>
           <a:p>
             <a:pPr>
               <a:lnSpc>
@@ -7360,9 +7399,9 @@
         <p:grpSpPr>
           <a:xfrm>
             <a:off x="2588040" y="4345920"/>
-            <a:ext cx="403920" cy="612720"/>
+            <a:ext cx="403560" cy="612720"/>
             <a:chOff x="2588040" y="4345920"/>
-            <a:chExt cx="403920" cy="612720"/>
+            <a:chExt cx="403560" cy="612720"/>
           </a:xfrm>
         </p:grpSpPr>
         <p:grpSp>
@@ -7473,7 +7512,7 @@
           <p:spPr>
             <a:xfrm>
               <a:off x="2687040" y="4551840"/>
-              <a:ext cx="304920" cy="276120"/>
+              <a:ext cx="304560" cy="275760"/>
             </a:xfrm>
             <a:prstGeom prst="rect">
               <a:avLst/>
@@ -7500,9 +7539,9 @@
         <p:grpSpPr>
           <a:xfrm>
             <a:off x="5343120" y="3771000"/>
-            <a:ext cx="403920" cy="612720"/>
+            <a:ext cx="403560" cy="612720"/>
             <a:chOff x="5343120" y="3771000"/>
-            <a:chExt cx="403920" cy="612720"/>
+            <a:chExt cx="403560" cy="612720"/>
           </a:xfrm>
         </p:grpSpPr>
         <p:grpSp>
@@ -7613,7 +7652,7 @@
           <p:spPr>
             <a:xfrm>
               <a:off x="5442120" y="3977280"/>
-              <a:ext cx="304920" cy="276120"/>
+              <a:ext cx="304560" cy="275760"/>
             </a:xfrm>
             <a:prstGeom prst="rect">
               <a:avLst/>
@@ -7640,9 +7679,9 @@
         <p:grpSpPr>
           <a:xfrm>
             <a:off x="4570920" y="2522880"/>
-            <a:ext cx="404280" cy="612720"/>
+            <a:ext cx="403920" cy="612720"/>
             <a:chOff x="4570920" y="2522880"/>
-            <a:chExt cx="404280" cy="612720"/>
+            <a:chExt cx="403920" cy="612720"/>
           </a:xfrm>
         </p:grpSpPr>
         <p:grpSp>
@@ -7753,7 +7792,7 @@
           <p:spPr>
             <a:xfrm>
               <a:off x="4670280" y="2729520"/>
-              <a:ext cx="304920" cy="276120"/>
+              <a:ext cx="304560" cy="275760"/>
             </a:xfrm>
             <a:prstGeom prst="rect">
               <a:avLst/>
@@ -7780,7 +7819,7 @@
         <p:spPr>
           <a:xfrm>
             <a:off x="2088000" y="4057200"/>
-            <a:ext cx="836280" cy="272520"/>
+            <a:ext cx="835920" cy="272160"/>
           </a:xfrm>
           <a:prstGeom prst="rect">
             <a:avLst/>
@@ -7797,7 +7836,9 @@
           <a:fontRef idx="minor"/>
         </p:style>
         <p:txBody>
-          <a:bodyPr lIns="90000" rIns="90000" tIns="45000" bIns="45000"/>
+          <a:bodyPr lIns="90000" rIns="90000" tIns="45000" bIns="45000">
+            <a:noAutofit/>
+          </a:bodyPr>
           <a:p>
             <a:pPr>
               <a:lnSpc>
@@ -7829,7 +7870,7 @@
         <p:spPr>
           <a:xfrm>
             <a:off x="-111600" y="4991040"/>
-            <a:ext cx="975600" cy="272520"/>
+            <a:ext cx="975240" cy="272160"/>
           </a:xfrm>
           <a:prstGeom prst="rect">
             <a:avLst/>
@@ -7846,7 +7887,9 @@
           <a:fontRef idx="minor"/>
         </p:style>
         <p:txBody>
-          <a:bodyPr lIns="90000" rIns="90000" tIns="45000" bIns="45000"/>
+          <a:bodyPr lIns="90000" rIns="90000" tIns="45000" bIns="45000">
+            <a:noAutofit/>
+          </a:bodyPr>
           <a:p>
             <a:pPr>
               <a:lnSpc>
@@ -7877,8 +7920,8 @@
         </p:nvSpPr>
         <p:spPr>
           <a:xfrm rot="10800000">
-            <a:off x="1299960" y="5520240"/>
-            <a:ext cx="490680" cy="95760"/>
+            <a:off x="1300320" y="5520600"/>
+            <a:ext cx="490320" cy="95400"/>
           </a:xfrm>
           <a:prstGeom prst="curvedConnector3">
             <a:avLst>
@@ -7909,10 +7952,10 @@
         </p:nvGrpSpPr>
         <p:grpSpPr>
           <a:xfrm>
-            <a:off x="106920" y="5468400"/>
-            <a:ext cx="613080" cy="345600"/>
-            <a:chOff x="106920" y="5468400"/>
-            <a:chExt cx="613080" cy="345600"/>
+            <a:off x="106920" y="5468760"/>
+            <a:ext cx="613080" cy="345240"/>
+            <a:chOff x="106920" y="5468760"/>
+            <a:chExt cx="613080" cy="345240"/>
           </a:xfrm>
         </p:grpSpPr>
         <p:sp>
@@ -7923,8 +7966,8 @@
           </p:nvSpPr>
           <p:spPr>
             <a:xfrm rot="16200000">
-              <a:off x="274680" y="5523480"/>
-              <a:ext cx="304920" cy="276120"/>
+              <a:off x="274680" y="5523840"/>
+              <a:ext cx="304560" cy="275760"/>
             </a:xfrm>
             <a:prstGeom prst="rect">
               <a:avLst/>
@@ -7949,10 +7992,10 @@
           </p:nvGrpSpPr>
           <p:grpSpPr>
             <a:xfrm>
-              <a:off x="106920" y="5468400"/>
-              <a:ext cx="613080" cy="331920"/>
-              <a:chOff x="106920" y="5468400"/>
-              <a:chExt cx="613080" cy="331920"/>
+              <a:off x="106920" y="5468760"/>
+              <a:ext cx="613080" cy="331560"/>
+              <a:chOff x="106920" y="5468760"/>
+              <a:chExt cx="613080" cy="331560"/>
             </a:xfrm>
           </p:grpSpPr>
           <p:grpSp>
@@ -7963,10 +8006,10 @@
             </p:nvGrpSpPr>
             <p:grpSpPr>
               <a:xfrm>
-                <a:off x="106920" y="5468400"/>
-                <a:ext cx="613080" cy="331920"/>
-                <a:chOff x="106920" y="5468400"/>
-                <a:chExt cx="613080" cy="331920"/>
+                <a:off x="106920" y="5468760"/>
+                <a:ext cx="613080" cy="331560"/>
+                <a:chOff x="106920" y="5468760"/>
+                <a:chExt cx="613080" cy="331560"/>
               </a:xfrm>
             </p:grpSpPr>
             <p:sp>
@@ -8061,8 +8104,8 @@
               </p:nvSpPr>
               <p:spPr>
                 <a:xfrm rot="16200000">
-                  <a:off x="298440" y="5482800"/>
-                  <a:ext cx="304560" cy="275760"/>
+                  <a:off x="298440" y="5483160"/>
+                  <a:ext cx="304200" cy="275400"/>
                 </a:xfrm>
                 <a:prstGeom prst="rect">
                   <a:avLst/>
@@ -8091,7 +8134,7 @@
         <p:spPr>
           <a:xfrm>
             <a:off x="7318440" y="588960"/>
-            <a:ext cx="2827080" cy="4509360"/>
+            <a:ext cx="2826720" cy="4509000"/>
           </a:xfrm>
           <a:prstGeom prst="ellipse">
             <a:avLst/>
@@ -8120,7 +8163,7 @@
         <p:spPr>
           <a:xfrm>
             <a:off x="3312000" y="594000"/>
-            <a:ext cx="1875600" cy="1637640"/>
+            <a:ext cx="1875240" cy="1637280"/>
           </a:xfrm>
           <a:prstGeom prst="ellipse">
             <a:avLst/>
@@ -8142,7 +8185,9 @@
           <a:fontRef idx="minor"/>
         </p:style>
         <p:txBody>
-          <a:bodyPr lIns="90000" rIns="90000" tIns="45000" bIns="45000" anchor="ctr"/>
+          <a:bodyPr lIns="90000" rIns="90000" tIns="45000" bIns="45000" anchor="ctr">
+            <a:noAutofit/>
+          </a:bodyPr>
           <a:p>
             <a:pPr algn="ctr">
               <a:lnSpc>
@@ -8173,10 +8218,10 @@
         </p:nvGrpSpPr>
         <p:grpSpPr>
           <a:xfrm>
-            <a:off x="360000" y="1872000"/>
-            <a:ext cx="613080" cy="348120"/>
-            <a:chOff x="360000" y="1872000"/>
-            <a:chExt cx="613080" cy="348120"/>
+            <a:off x="360000" y="1872360"/>
+            <a:ext cx="613080" cy="347760"/>
+            <a:chOff x="360000" y="1872360"/>
+            <a:chExt cx="613080" cy="347760"/>
           </a:xfrm>
         </p:grpSpPr>
         <p:sp>
@@ -8187,8 +8232,8 @@
           </p:nvSpPr>
           <p:spPr>
             <a:xfrm rot="16200000">
-              <a:off x="524880" y="1929600"/>
-              <a:ext cx="304920" cy="276120"/>
+              <a:off x="524880" y="1929960"/>
+              <a:ext cx="304560" cy="275760"/>
             </a:xfrm>
             <a:prstGeom prst="rect">
               <a:avLst/>
@@ -8213,10 +8258,10 @@
           </p:nvGrpSpPr>
           <p:grpSpPr>
             <a:xfrm>
-              <a:off x="360000" y="1872000"/>
-              <a:ext cx="613080" cy="333720"/>
-              <a:chOff x="360000" y="1872000"/>
-              <a:chExt cx="613080" cy="333720"/>
+              <a:off x="360000" y="1872360"/>
+              <a:ext cx="613080" cy="333360"/>
+              <a:chOff x="360000" y="1872360"/>
+              <a:chExt cx="613080" cy="333360"/>
             </a:xfrm>
           </p:grpSpPr>
           <p:grpSp>
@@ -8227,10 +8272,10 @@
             </p:nvGrpSpPr>
             <p:grpSpPr>
               <a:xfrm>
-                <a:off x="360000" y="1872000"/>
-                <a:ext cx="613080" cy="333720"/>
-                <a:chOff x="360000" y="1872000"/>
-                <a:chExt cx="613080" cy="333720"/>
+                <a:off x="360000" y="1872360"/>
+                <a:ext cx="613080" cy="333360"/>
+                <a:chOff x="360000" y="1872360"/>
+                <a:chExt cx="613080" cy="333360"/>
               </a:xfrm>
             </p:grpSpPr>
             <p:sp>
@@ -8325,8 +8370,8 @@
               </p:nvSpPr>
               <p:spPr>
                 <a:xfrm rot="16200000">
-                  <a:off x="551520" y="1886400"/>
-                  <a:ext cx="304560" cy="275760"/>
+                  <a:off x="551520" y="1886760"/>
+                  <a:ext cx="304200" cy="275400"/>
                 </a:xfrm>
                 <a:prstGeom prst="rect">
                   <a:avLst/>
@@ -8354,10 +8399,10 @@
         </p:nvGrpSpPr>
         <p:grpSpPr>
           <a:xfrm>
-            <a:off x="10032840" y="6072480"/>
-            <a:ext cx="613080" cy="346320"/>
-            <a:chOff x="10032840" y="6072480"/>
-            <a:chExt cx="613080" cy="346320"/>
+            <a:off x="10032840" y="6072840"/>
+            <a:ext cx="613080" cy="345960"/>
+            <a:chOff x="10032840" y="6072840"/>
+            <a:chExt cx="613080" cy="345960"/>
           </a:xfrm>
         </p:grpSpPr>
         <p:sp>
@@ -8368,8 +8413,8 @@
           </p:nvSpPr>
           <p:spPr>
             <a:xfrm rot="16200000">
-              <a:off x="10200960" y="6128280"/>
-              <a:ext cx="304920" cy="276120"/>
+              <a:off x="10200960" y="6128640"/>
+              <a:ext cx="304560" cy="275760"/>
             </a:xfrm>
             <a:prstGeom prst="rect">
               <a:avLst/>
@@ -8394,10 +8439,10 @@
           </p:nvGrpSpPr>
           <p:grpSpPr>
             <a:xfrm>
-              <a:off x="10032840" y="6072480"/>
-              <a:ext cx="613080" cy="331920"/>
-              <a:chOff x="10032840" y="6072480"/>
-              <a:chExt cx="613080" cy="331920"/>
+              <a:off x="10032840" y="6072840"/>
+              <a:ext cx="613080" cy="331200"/>
+              <a:chOff x="10032840" y="6072840"/>
+              <a:chExt cx="613080" cy="331200"/>
             </a:xfrm>
           </p:grpSpPr>
           <p:grpSp>
@@ -8408,10 +8453,10 @@
             </p:nvGrpSpPr>
             <p:grpSpPr>
               <a:xfrm>
-                <a:off x="10032840" y="6072480"/>
-                <a:ext cx="613080" cy="331920"/>
-                <a:chOff x="10032840" y="6072480"/>
-                <a:chExt cx="613080" cy="331920"/>
+                <a:off x="10032840" y="6072840"/>
+                <a:ext cx="613080" cy="331200"/>
+                <a:chOff x="10032840" y="6072840"/>
+                <a:chExt cx="613080" cy="331200"/>
               </a:xfrm>
             </p:grpSpPr>
             <p:sp>
@@ -8422,7 +8467,7 @@
               </p:nvSpPr>
               <p:spPr>
                 <a:xfrm flipV="1">
-                  <a:off x="10032840" y="6404040"/>
+                  <a:off x="10032840" y="6403680"/>
                   <a:ext cx="612360" cy="360"/>
                 </a:xfrm>
                 <a:prstGeom prst="line">
@@ -8450,7 +8495,7 @@
               </p:nvSpPr>
               <p:spPr>
                 <a:xfrm flipV="1">
-                  <a:off x="10032840" y="6121440"/>
+                  <a:off x="10032840" y="6121080"/>
                   <a:ext cx="360" cy="282600"/>
                 </a:xfrm>
                 <a:prstGeom prst="line">
@@ -8478,7 +8523,7 @@
               </p:nvSpPr>
               <p:spPr>
                 <a:xfrm flipV="1">
-                  <a:off x="10645560" y="6121080"/>
+                  <a:off x="10645560" y="6120720"/>
                   <a:ext cx="360" cy="282960"/>
                 </a:xfrm>
                 <a:prstGeom prst="line">
@@ -8506,8 +8551,8 @@
               </p:nvSpPr>
               <p:spPr>
                 <a:xfrm rot="16200000">
-                  <a:off x="10225440" y="6086880"/>
-                  <a:ext cx="304560" cy="275760"/>
+                  <a:off x="10225440" y="6087240"/>
+                  <a:ext cx="304200" cy="275400"/>
                 </a:xfrm>
                 <a:prstGeom prst="rect">
                   <a:avLst/>
@@ -8527,12 +8572,12 @@
           </p:grpSp>
         </p:grpSp>
       </p:grpSp>
-      <p:cxnSp>
-        <p:nvCxnSpPr>
+      <p:sp>
+        <p:nvSpPr>
           <p:cNvPr id="243" name="Line 75"/>
-          <p:cNvCxnSpPr/>
-          <p:nvPr/>
-        </p:nvCxnSpPr>
+          <p:cNvSpPr/>
+          <p:nvPr/>
+        </p:nvSpPr>
         <p:spPr>
           <a:xfrm>
             <a:off x="0" y="0"/>
@@ -8549,13 +8594,19 @@
             <a:tailEnd len="med" type="triangle" w="med"/>
           </a:ln>
         </p:spPr>
-      </p:cxnSp>
-      <p:cxnSp>
-        <p:nvCxnSpPr>
+        <p:style>
+          <a:lnRef idx="0"/>
+          <a:fillRef idx="0"/>
+          <a:effectRef idx="0"/>
+          <a:fontRef idx="minor"/>
+        </p:style>
+      </p:sp>
+      <p:sp>
+        <p:nvSpPr>
           <p:cNvPr id="244" name="Line 76"/>
-          <p:cNvCxnSpPr/>
-          <p:nvPr/>
-        </p:nvCxnSpPr>
+          <p:cNvSpPr/>
+          <p:nvPr/>
+        </p:nvSpPr>
         <p:spPr>
           <a:xfrm>
             <a:off x="0" y="0"/>
@@ -8572,13 +8623,19 @@
             <a:tailEnd len="med" type="triangle" w="med"/>
           </a:ln>
         </p:spPr>
-      </p:cxnSp>
-      <p:cxnSp>
-        <p:nvCxnSpPr>
+        <p:style>
+          <a:lnRef idx="0"/>
+          <a:fillRef idx="0"/>
+          <a:effectRef idx="0"/>
+          <a:fontRef idx="minor"/>
+        </p:style>
+      </p:sp>
+      <p:sp>
+        <p:nvSpPr>
           <p:cNvPr id="245" name="Line 77"/>
-          <p:cNvCxnSpPr/>
-          <p:nvPr/>
-        </p:nvCxnSpPr>
+          <p:cNvSpPr/>
+          <p:nvPr/>
+        </p:nvSpPr>
         <p:spPr>
           <a:xfrm>
             <a:off x="0" y="0"/>
@@ -8595,13 +8652,19 @@
             <a:tailEnd len="med" type="triangle" w="med"/>
           </a:ln>
         </p:spPr>
-      </p:cxnSp>
-      <p:cxnSp>
-        <p:nvCxnSpPr>
+        <p:style>
+          <a:lnRef idx="0"/>
+          <a:fillRef idx="0"/>
+          <a:effectRef idx="0"/>
+          <a:fontRef idx="minor"/>
+        </p:style>
+      </p:sp>
+      <p:sp>
+        <p:nvSpPr>
           <p:cNvPr id="246" name="Line 78"/>
-          <p:cNvCxnSpPr/>
-          <p:nvPr/>
-        </p:nvCxnSpPr>
+          <p:cNvSpPr/>
+          <p:nvPr/>
+        </p:nvSpPr>
         <p:spPr>
           <a:xfrm>
             <a:off x="0" y="0"/>
@@ -8618,13 +8681,19 @@
             <a:tailEnd len="med" type="triangle" w="med"/>
           </a:ln>
         </p:spPr>
-      </p:cxnSp>
-      <p:cxnSp>
-        <p:nvCxnSpPr>
+        <p:style>
+          <a:lnRef idx="0"/>
+          <a:fillRef idx="0"/>
+          <a:effectRef idx="0"/>
+          <a:fontRef idx="minor"/>
+        </p:style>
+      </p:sp>
+      <p:sp>
+        <p:nvSpPr>
           <p:cNvPr id="247" name="Line 79"/>
-          <p:cNvCxnSpPr/>
-          <p:nvPr/>
-        </p:nvCxnSpPr>
+          <p:cNvSpPr/>
+          <p:nvPr/>
+        </p:nvSpPr>
         <p:spPr>
           <a:xfrm>
             <a:off x="0" y="0"/>
@@ -8641,13 +8710,19 @@
             <a:tailEnd len="med" type="triangle" w="med"/>
           </a:ln>
         </p:spPr>
-      </p:cxnSp>
-      <p:cxnSp>
-        <p:nvCxnSpPr>
+        <p:style>
+          <a:lnRef idx="0"/>
+          <a:fillRef idx="0"/>
+          <a:effectRef idx="0"/>
+          <a:fontRef idx="minor"/>
+        </p:style>
+      </p:sp>
+      <p:sp>
+        <p:nvSpPr>
           <p:cNvPr id="248" name="Line 80"/>
-          <p:cNvCxnSpPr/>
-          <p:nvPr/>
-        </p:nvCxnSpPr>
+          <p:cNvSpPr/>
+          <p:nvPr/>
+        </p:nvSpPr>
         <p:spPr>
           <a:xfrm>
             <a:off x="0" y="0"/>
@@ -8664,13 +8739,19 @@
             <a:tailEnd len="med" type="triangle" w="med"/>
           </a:ln>
         </p:spPr>
-      </p:cxnSp>
-      <p:cxnSp>
-        <p:nvCxnSpPr>
+        <p:style>
+          <a:lnRef idx="0"/>
+          <a:fillRef idx="0"/>
+          <a:effectRef idx="0"/>
+          <a:fontRef idx="minor"/>
+        </p:style>
+      </p:sp>
+      <p:sp>
+        <p:nvSpPr>
           <p:cNvPr id="249" name="Line 81"/>
-          <p:cNvCxnSpPr/>
-          <p:nvPr/>
-        </p:nvCxnSpPr>
+          <p:cNvSpPr/>
+          <p:nvPr/>
+        </p:nvSpPr>
         <p:spPr>
           <a:xfrm>
             <a:off x="0" y="0"/>
@@ -8687,13 +8768,19 @@
             <a:tailEnd len="med" type="triangle" w="med"/>
           </a:ln>
         </p:spPr>
-      </p:cxnSp>
-      <p:cxnSp>
-        <p:nvCxnSpPr>
+        <p:style>
+          <a:lnRef idx="0"/>
+          <a:fillRef idx="0"/>
+          <a:effectRef idx="0"/>
+          <a:fontRef idx="minor"/>
+        </p:style>
+      </p:sp>
+      <p:sp>
+        <p:nvSpPr>
           <p:cNvPr id="250" name="Line 82"/>
-          <p:cNvCxnSpPr/>
-          <p:nvPr/>
-        </p:nvCxnSpPr>
+          <p:cNvSpPr/>
+          <p:nvPr/>
+        </p:nvSpPr>
         <p:spPr>
           <a:xfrm>
             <a:off x="0" y="0"/>
@@ -8710,13 +8797,19 @@
             <a:tailEnd len="med" type="triangle" w="med"/>
           </a:ln>
         </p:spPr>
-      </p:cxnSp>
-      <p:cxnSp>
-        <p:nvCxnSpPr>
+        <p:style>
+          <a:lnRef idx="0"/>
+          <a:fillRef idx="0"/>
+          <a:effectRef idx="0"/>
+          <a:fontRef idx="minor"/>
+        </p:style>
+      </p:sp>
+      <p:sp>
+        <p:nvSpPr>
           <p:cNvPr id="251" name="Line 83"/>
-          <p:cNvCxnSpPr/>
-          <p:nvPr/>
-        </p:nvCxnSpPr>
+          <p:cNvSpPr/>
+          <p:nvPr/>
+        </p:nvSpPr>
         <p:spPr>
           <a:xfrm>
             <a:off x="0" y="0"/>
@@ -8733,13 +8826,19 @@
             <a:tailEnd len="med" type="triangle" w="med"/>
           </a:ln>
         </p:spPr>
-      </p:cxnSp>
-      <p:cxnSp>
-        <p:nvCxnSpPr>
+        <p:style>
+          <a:lnRef idx="0"/>
+          <a:fillRef idx="0"/>
+          <a:effectRef idx="0"/>
+          <a:fontRef idx="minor"/>
+        </p:style>
+      </p:sp>
+      <p:sp>
+        <p:nvSpPr>
           <p:cNvPr id="252" name="Line 84"/>
-          <p:cNvCxnSpPr/>
-          <p:nvPr/>
-        </p:nvCxnSpPr>
+          <p:cNvSpPr/>
+          <p:nvPr/>
+        </p:nvSpPr>
         <p:spPr>
           <a:xfrm>
             <a:off x="0" y="0"/>
@@ -8755,13 +8854,19 @@
             <a:tailEnd len="med" type="triangle" w="med"/>
           </a:ln>
         </p:spPr>
-      </p:cxnSp>
-      <p:cxnSp>
-        <p:nvCxnSpPr>
+        <p:style>
+          <a:lnRef idx="0"/>
+          <a:fillRef idx="0"/>
+          <a:effectRef idx="0"/>
+          <a:fontRef idx="minor"/>
+        </p:style>
+      </p:sp>
+      <p:sp>
+        <p:nvSpPr>
           <p:cNvPr id="253" name="Line 85"/>
-          <p:cNvCxnSpPr/>
-          <p:nvPr/>
-        </p:nvCxnSpPr>
+          <p:cNvSpPr/>
+          <p:nvPr/>
+        </p:nvSpPr>
         <p:spPr>
           <a:xfrm>
             <a:off x="0" y="0"/>
@@ -8777,13 +8882,19 @@
             <a:tailEnd len="med" type="triangle" w="med"/>
           </a:ln>
         </p:spPr>
-      </p:cxnSp>
-      <p:cxnSp>
-        <p:nvCxnSpPr>
+        <p:style>
+          <a:lnRef idx="0"/>
+          <a:fillRef idx="0"/>
+          <a:effectRef idx="0"/>
+          <a:fontRef idx="minor"/>
+        </p:style>
+      </p:sp>
+      <p:sp>
+        <p:nvSpPr>
           <p:cNvPr id="254" name="Line 86"/>
-          <p:cNvCxnSpPr/>
-          <p:nvPr/>
-        </p:nvCxnSpPr>
+          <p:cNvSpPr/>
+          <p:nvPr/>
+        </p:nvSpPr>
         <p:spPr>
           <a:xfrm>
             <a:off x="0" y="0"/>
@@ -8799,13 +8910,19 @@
             <a:tailEnd len="med" type="triangle" w="med"/>
           </a:ln>
         </p:spPr>
-      </p:cxnSp>
-      <p:cxnSp>
-        <p:nvCxnSpPr>
+        <p:style>
+          <a:lnRef idx="0"/>
+          <a:fillRef idx="0"/>
+          <a:effectRef idx="0"/>
+          <a:fontRef idx="minor"/>
+        </p:style>
+      </p:sp>
+      <p:sp>
+        <p:nvSpPr>
           <p:cNvPr id="255" name="Line 87"/>
-          <p:cNvCxnSpPr/>
-          <p:nvPr/>
-        </p:nvCxnSpPr>
+          <p:cNvSpPr/>
+          <p:nvPr/>
+        </p:nvSpPr>
         <p:spPr>
           <a:xfrm>
             <a:off x="0" y="0"/>
@@ -8821,13 +8938,19 @@
             <a:tailEnd len="med" type="triangle" w="med"/>
           </a:ln>
         </p:spPr>
-      </p:cxnSp>
-      <p:cxnSp>
-        <p:nvCxnSpPr>
+        <p:style>
+          <a:lnRef idx="0"/>
+          <a:fillRef idx="0"/>
+          <a:effectRef idx="0"/>
+          <a:fontRef idx="minor"/>
+        </p:style>
+      </p:sp>
+      <p:sp>
+        <p:nvSpPr>
           <p:cNvPr id="256" name="Line 88"/>
-          <p:cNvCxnSpPr/>
-          <p:nvPr/>
-        </p:nvCxnSpPr>
+          <p:cNvSpPr/>
+          <p:nvPr/>
+        </p:nvSpPr>
         <p:spPr>
           <a:xfrm>
             <a:off x="0" y="0"/>
@@ -8844,13 +8967,19 @@
             <a:tailEnd len="med" type="triangle" w="med"/>
           </a:ln>
         </p:spPr>
-      </p:cxnSp>
-      <p:cxnSp>
-        <p:nvCxnSpPr>
+        <p:style>
+          <a:lnRef idx="0"/>
+          <a:fillRef idx="0"/>
+          <a:effectRef idx="0"/>
+          <a:fontRef idx="minor"/>
+        </p:style>
+      </p:sp>
+      <p:sp>
+        <p:nvSpPr>
           <p:cNvPr id="257" name="Line 89"/>
-          <p:cNvCxnSpPr/>
-          <p:nvPr/>
-        </p:nvCxnSpPr>
+          <p:cNvSpPr/>
+          <p:nvPr/>
+        </p:nvSpPr>
         <p:spPr>
           <a:xfrm>
             <a:off x="0" y="0"/>
@@ -8867,13 +8996,19 @@
             <a:tailEnd len="med" type="triangle" w="med"/>
           </a:ln>
         </p:spPr>
-      </p:cxnSp>
-      <p:cxnSp>
-        <p:nvCxnSpPr>
+        <p:style>
+          <a:lnRef idx="0"/>
+          <a:fillRef idx="0"/>
+          <a:effectRef idx="0"/>
+          <a:fontRef idx="minor"/>
+        </p:style>
+      </p:sp>
+      <p:sp>
+        <p:nvSpPr>
           <p:cNvPr id="258" name="Line 90"/>
-          <p:cNvCxnSpPr/>
-          <p:nvPr/>
-        </p:nvCxnSpPr>
+          <p:cNvSpPr/>
+          <p:nvPr/>
+        </p:nvSpPr>
         <p:spPr>
           <a:xfrm>
             <a:off x="0" y="0"/>
@@ -8889,7 +9024,13 @@
             <a:tailEnd len="med" type="triangle" w="med"/>
           </a:ln>
         </p:spPr>
-      </p:cxnSp>
+        <p:style>
+          <a:lnRef idx="0"/>
+          <a:fillRef idx="0"/>
+          <a:effectRef idx="0"/>
+          <a:fontRef idx="minor"/>
+        </p:style>
+      </p:sp>
     </p:spTree>
   </p:cSld>
   <mc:AlternateContent>
@@ -8900,33 +9041,6 @@
       <p:transition spd="slow"/>
     </mc:Fallback>
   </mc:AlternateContent>
-  <p:timing>
-    <p:tnLst>
-      <p:par>
-        <p:cTn id="3" dur="indefinite" restart="never" nodeType="tmRoot">
-          <p:childTnLst>
-            <p:seq>
-              <p:cTn id="4" dur="indefinite" nodeType="mainSeq"/>
-              <p:prevCondLst>
-                <p:cond delay="0" evt="onPrev">
-                  <p:tgtEl>
-                    <p:sldTgt/>
-                  </p:tgtEl>
-                </p:cond>
-              </p:prevCondLst>
-              <p:nextCondLst>
-                <p:cond delay="0" evt="onNext">
-                  <p:tgtEl>
-                    <p:sldTgt/>
-                  </p:tgtEl>
-                </p:cond>
-              </p:nextCondLst>
-            </p:seq>
-          </p:childTnLst>
-        </p:cTn>
-      </p:par>
-    </p:tnLst>
-  </p:timing>
 </p:sld>
 </file>
 
@@ -8956,7 +9070,7 @@
         <p:spPr>
           <a:xfrm>
             <a:off x="85680" y="3105000"/>
-            <a:ext cx="351720" cy="323280"/>
+            <a:ext cx="351360" cy="322920"/>
           </a:xfrm>
           <a:prstGeom prst="ellipse">
             <a:avLst/>
@@ -8987,7 +9101,7 @@
         <p:spPr>
           <a:xfrm>
             <a:off x="1123920" y="2867040"/>
-            <a:ext cx="1885320" cy="799560"/>
+            <a:ext cx="1884960" cy="799200"/>
           </a:xfrm>
           <a:prstGeom prst="roundRect">
             <a:avLst>
@@ -9011,7 +9125,9 @@
           <a:fontRef idx="minor"/>
         </p:style>
         <p:txBody>
-          <a:bodyPr lIns="90000" rIns="90000" tIns="45000" bIns="45000" anchor="ctr"/>
+          <a:bodyPr lIns="90000" rIns="90000" tIns="45000" bIns="45000" anchor="ctr">
+            <a:noAutofit/>
+          </a:bodyPr>
           <a:p>
             <a:pPr algn="ctr">
               <a:lnSpc>
@@ -9043,7 +9159,7 @@
         <p:spPr>
           <a:xfrm>
             <a:off x="438120" y="3267000"/>
-            <a:ext cx="685080" cy="360"/>
+            <a:ext cx="684720" cy="360"/>
           </a:xfrm>
           <a:custGeom>
             <a:avLst/>
@@ -9085,8 +9201,8 @@
         </p:nvSpPr>
         <p:spPr>
           <a:xfrm>
-            <a:off x="2771640" y="1943640"/>
-            <a:ext cx="1470960" cy="941760"/>
+            <a:off x="1944000" y="2019960"/>
+            <a:ext cx="1800000" cy="504000"/>
           </a:xfrm>
           <a:prstGeom prst="rect">
             <a:avLst/>
@@ -9103,7 +9219,9 @@
           <a:fontRef idx="minor"/>
         </p:style>
         <p:txBody>
-          <a:bodyPr lIns="90000" rIns="90000" tIns="45000" bIns="45000"/>
+          <a:bodyPr lIns="90000" rIns="90000" tIns="45000" bIns="45000">
+            <a:noAutofit/>
+          </a:bodyPr>
           <a:p>
             <a:pPr>
               <a:lnSpc>
@@ -9147,7 +9265,7 @@
         <p:spPr>
           <a:xfrm>
             <a:off x="3772080" y="2867040"/>
-            <a:ext cx="1885320" cy="799560"/>
+            <a:ext cx="1884960" cy="799200"/>
           </a:xfrm>
           <a:prstGeom prst="roundRect">
             <a:avLst>
@@ -9171,7 +9289,9 @@
           <a:fontRef idx="minor"/>
         </p:style>
         <p:txBody>
-          <a:bodyPr lIns="90000" rIns="90000" tIns="45000" bIns="45000" anchor="ctr"/>
+          <a:bodyPr lIns="90000" rIns="90000" tIns="45000" bIns="45000" anchor="ctr">
+            <a:noAutofit/>
+          </a:bodyPr>
           <a:p>
             <a:pPr algn="ctr">
               <a:lnSpc>
@@ -9202,8 +9322,8 @@
         </p:nvSpPr>
         <p:spPr>
           <a:xfrm flipV="1">
-            <a:off x="3009960" y="3264840"/>
-            <a:ext cx="761400" cy="360"/>
+            <a:off x="3009960" y="3264120"/>
+            <a:ext cx="761040" cy="360"/>
           </a:xfrm>
           <a:custGeom>
             <a:avLst/>
@@ -9245,12 +9365,12 @@
         </p:nvSpPr>
         <p:spPr>
           <a:xfrm flipH="1" flipV="1" rot="16200000">
-            <a:off x="3389400" y="1541160"/>
-            <a:ext cx="360" cy="2647080"/>
+            <a:off x="3389040" y="1540440"/>
+            <a:ext cx="360" cy="2646720"/>
           </a:xfrm>
           <a:prstGeom prst="curvedConnector3">
             <a:avLst>
-              <a:gd name="adj1" fmla="val 0"/>
+              <a:gd name="adj1" fmla="val -40750000"/>
             </a:avLst>
           </a:prstGeom>
           <a:noFill/>
@@ -9278,7 +9398,7 @@
         <p:spPr>
           <a:xfrm>
             <a:off x="6400800" y="390600"/>
-            <a:ext cx="2199600" cy="761400"/>
+            <a:ext cx="2199240" cy="761040"/>
           </a:xfrm>
           <a:prstGeom prst="roundRect">
             <a:avLst>
@@ -9302,7 +9422,9 @@
           <a:fontRef idx="minor"/>
         </p:style>
         <p:txBody>
-          <a:bodyPr lIns="90000" rIns="90000" tIns="45000" bIns="45000" anchor="ctr"/>
+          <a:bodyPr lIns="90000" rIns="90000" tIns="45000" bIns="45000" anchor="ctr">
+            <a:noAutofit/>
+          </a:bodyPr>
           <a:p>
             <a:pPr algn="ctr">
               <a:lnSpc>
@@ -9334,7 +9456,7 @@
         <p:spPr>
           <a:xfrm>
             <a:off x="6400800" y="3943440"/>
-            <a:ext cx="2199600" cy="761400"/>
+            <a:ext cx="2199240" cy="761040"/>
           </a:xfrm>
           <a:prstGeom prst="roundRect">
             <a:avLst>
@@ -9358,7 +9480,9 @@
           <a:fontRef idx="minor"/>
         </p:style>
         <p:txBody>
-          <a:bodyPr lIns="90000" rIns="90000" tIns="45000" bIns="45000" anchor="ctr"/>
+          <a:bodyPr lIns="90000" rIns="90000" tIns="45000" bIns="45000" anchor="ctr">
+            <a:noAutofit/>
+          </a:bodyPr>
           <a:p>
             <a:pPr algn="ctr">
               <a:lnSpc>
@@ -9390,7 +9514,7 @@
         <p:spPr>
           <a:xfrm>
             <a:off x="6400800" y="5419800"/>
-            <a:ext cx="2199600" cy="761400"/>
+            <a:ext cx="2199240" cy="761040"/>
           </a:xfrm>
           <a:prstGeom prst="roundRect">
             <a:avLst>
@@ -9414,7 +9538,9 @@
           <a:fontRef idx="minor"/>
         </p:style>
         <p:txBody>
-          <a:bodyPr lIns="90000" rIns="90000" tIns="45000" bIns="45000" anchor="ctr"/>
+          <a:bodyPr lIns="90000" rIns="90000" tIns="45000" bIns="45000" anchor="ctr">
+            <a:noAutofit/>
+          </a:bodyPr>
           <a:p>
             <a:pPr algn="ctr">
               <a:lnSpc>
@@ -9445,8 +9571,8 @@
         </p:nvSpPr>
         <p:spPr>
           <a:xfrm flipV="1">
-            <a:off x="5657760" y="770040"/>
-            <a:ext cx="742320" cy="2494800"/>
+            <a:off x="5657760" y="768960"/>
+            <a:ext cx="741960" cy="2494440"/>
           </a:xfrm>
           <a:prstGeom prst="curvedConnector3">
             <a:avLst>
@@ -9477,8 +9603,8 @@
         </p:nvSpPr>
         <p:spPr>
           <a:xfrm flipV="1">
-            <a:off x="5657760" y="2247120"/>
-            <a:ext cx="742320" cy="1018440"/>
+            <a:off x="5657760" y="2246760"/>
+            <a:ext cx="741960" cy="1018080"/>
           </a:xfrm>
           <a:prstGeom prst="curvedConnector3">
             <a:avLst>
@@ -9510,7 +9636,7 @@
         <p:spPr>
           <a:xfrm>
             <a:off x="5657760" y="3267000"/>
-            <a:ext cx="742320" cy="1056600"/>
+            <a:ext cx="741960" cy="1056240"/>
           </a:xfrm>
           <a:prstGeom prst="curvedConnector3">
             <a:avLst>
@@ -9542,7 +9668,7 @@
         <p:spPr>
           <a:xfrm>
             <a:off x="5657760" y="3267000"/>
-            <a:ext cx="742320" cy="2532960"/>
+            <a:ext cx="741960" cy="2532600"/>
           </a:xfrm>
           <a:prstGeom prst="curvedConnector3">
             <a:avLst>
@@ -9573,8 +9699,8 @@
         </p:nvSpPr>
         <p:spPr>
           <a:xfrm>
-            <a:off x="4305240" y="1929240"/>
-            <a:ext cx="2199600" cy="728640"/>
+            <a:off x="6080760" y="2538720"/>
+            <a:ext cx="2775240" cy="728280"/>
           </a:xfrm>
           <a:prstGeom prst="rect">
             <a:avLst/>
@@ -9591,7 +9717,9 @@
           <a:fontRef idx="minor"/>
         </p:style>
         <p:txBody>
-          <a:bodyPr lIns="90000" rIns="90000" tIns="45000" bIns="45000"/>
+          <a:bodyPr lIns="90000" rIns="90000" tIns="45000" bIns="45000">
+            <a:noAutofit/>
+          </a:bodyPr>
           <a:p>
             <a:pPr>
               <a:lnSpc>
@@ -9635,7 +9763,7 @@
         <p:spPr>
           <a:xfrm>
             <a:off x="6124680" y="3305160"/>
-            <a:ext cx="2199600" cy="516240"/>
+            <a:ext cx="2199240" cy="515880"/>
           </a:xfrm>
           <a:prstGeom prst="rect">
             <a:avLst/>
@@ -9652,7 +9780,9 @@
           <a:fontRef idx="minor"/>
         </p:style>
         <p:txBody>
-          <a:bodyPr lIns="90000" rIns="90000" tIns="45000" bIns="45000"/>
+          <a:bodyPr lIns="90000" rIns="90000" tIns="45000" bIns="45000">
+            <a:noAutofit/>
+          </a:bodyPr>
           <a:p>
             <a:pPr>
               <a:lnSpc>
@@ -9695,8 +9825,8 @@
         </p:nvSpPr>
         <p:spPr>
           <a:xfrm>
-            <a:off x="6124680" y="4800960"/>
-            <a:ext cx="2656800" cy="728640"/>
+            <a:off x="5981040" y="4824000"/>
+            <a:ext cx="3306960" cy="504000"/>
           </a:xfrm>
           <a:prstGeom prst="rect">
             <a:avLst/>
@@ -9713,7 +9843,9 @@
           <a:fontRef idx="minor"/>
         </p:style>
         <p:txBody>
-          <a:bodyPr lIns="90000" rIns="90000" tIns="45000" bIns="45000"/>
+          <a:bodyPr lIns="90000" rIns="90000" tIns="45000" bIns="45000">
+            <a:noAutofit/>
+          </a:bodyPr>
           <a:p>
             <a:pPr>
               <a:lnSpc>
@@ -9757,7 +9889,7 @@
         <p:spPr>
           <a:xfrm>
             <a:off x="3454560" y="2523960"/>
-            <a:ext cx="633960" cy="1627920"/>
+            <a:ext cx="633600" cy="1627560"/>
           </a:xfrm>
           <a:custGeom>
             <a:avLst/>
@@ -9806,7 +9938,7 @@
         <p:spPr>
           <a:xfrm>
             <a:off x="6400800" y="1866960"/>
-            <a:ext cx="2199600" cy="761400"/>
+            <a:ext cx="2199240" cy="761040"/>
           </a:xfrm>
           <a:prstGeom prst="roundRect">
             <a:avLst>
@@ -9830,7 +9962,9 @@
           <a:fontRef idx="minor"/>
         </p:style>
         <p:txBody>
-          <a:bodyPr lIns="90000" rIns="90000" tIns="45000" bIns="45000" anchor="ctr"/>
+          <a:bodyPr lIns="90000" rIns="90000" tIns="45000" bIns="45000" anchor="ctr">
+            <a:noAutofit/>
+          </a:bodyPr>
           <a:p>
             <a:pPr algn="ctr">
               <a:lnSpc>
@@ -9861,8 +9995,8 @@
         </p:nvSpPr>
         <p:spPr>
           <a:xfrm>
-            <a:off x="4957920" y="1067040"/>
-            <a:ext cx="1546920" cy="941760"/>
+            <a:off x="6192000" y="1290600"/>
+            <a:ext cx="1872000" cy="509400"/>
           </a:xfrm>
           <a:prstGeom prst="rect">
             <a:avLst/>
@@ -9879,7 +10013,9 @@
           <a:fontRef idx="minor"/>
         </p:style>
         <p:txBody>
-          <a:bodyPr lIns="90000" rIns="90000" tIns="45000" bIns="45000"/>
+          <a:bodyPr lIns="90000" rIns="90000" tIns="45000" bIns="45000">
+            <a:noAutofit/>
+          </a:bodyPr>
           <a:p>
             <a:pPr>
               <a:lnSpc>
@@ -9951,7 +10087,7 @@
         <p:spPr>
           <a:xfrm>
             <a:off x="8601120" y="771480"/>
-            <a:ext cx="990000" cy="360"/>
+            <a:ext cx="989640" cy="360"/>
           </a:xfrm>
           <a:custGeom>
             <a:avLst/>
@@ -9994,7 +10130,7 @@
         <p:spPr>
           <a:xfrm>
             <a:off x="8601120" y="2247840"/>
-            <a:ext cx="1028160" cy="360"/>
+            <a:ext cx="1027800" cy="360"/>
           </a:xfrm>
           <a:custGeom>
             <a:avLst/>
@@ -10037,7 +10173,7 @@
         <p:spPr>
           <a:xfrm>
             <a:off x="8601120" y="4324320"/>
-            <a:ext cx="1065960" cy="360"/>
+            <a:ext cx="1065600" cy="360"/>
           </a:xfrm>
           <a:custGeom>
             <a:avLst/>
@@ -10080,7 +10216,7 @@
         <p:spPr>
           <a:xfrm>
             <a:off x="8601120" y="5800680"/>
-            <a:ext cx="1028160" cy="360"/>
+            <a:ext cx="1027800" cy="360"/>
           </a:xfrm>
           <a:custGeom>
             <a:avLst/>
@@ -10124,33 +10260,6 @@
       <p:transition spd="slow"/>
     </mc:Fallback>
   </mc:AlternateContent>
-  <p:timing>
-    <p:tnLst>
-      <p:par>
-        <p:cTn id="5" dur="indefinite" restart="never" nodeType="tmRoot">
-          <p:childTnLst>
-            <p:seq>
-              <p:cTn id="6" dur="indefinite" nodeType="mainSeq"/>
-              <p:prevCondLst>
-                <p:cond delay="0" evt="onPrev">
-                  <p:tgtEl>
-                    <p:sldTgt/>
-                  </p:tgtEl>
-                </p:cond>
-              </p:prevCondLst>
-              <p:nextCondLst>
-                <p:cond delay="0" evt="onNext">
-                  <p:tgtEl>
-                    <p:sldTgt/>
-                  </p:tgtEl>
-                </p:cond>
-              </p:nextCondLst>
-            </p:seq>
-          </p:childTnLst>
-        </p:cTn>
-      </p:par>
-    </p:tnLst>
-  </p:timing>
 </p:sld>
 </file>
 
@@ -10180,7 +10289,7 @@
         <p:spPr>
           <a:xfrm>
             <a:off x="105480" y="3332160"/>
-            <a:ext cx="324720" cy="280800"/>
+            <a:ext cx="324360" cy="280440"/>
           </a:xfrm>
           <a:prstGeom prst="ellipse">
             <a:avLst/>
@@ -10211,7 +10320,7 @@
         <p:spPr>
           <a:xfrm>
             <a:off x="993600" y="3086280"/>
-            <a:ext cx="1142280" cy="772920"/>
+            <a:ext cx="1141920" cy="772560"/>
           </a:xfrm>
           <a:prstGeom prst="roundRect">
             <a:avLst>
@@ -10235,7 +10344,9 @@
           <a:fontRef idx="minor"/>
         </p:style>
         <p:txBody>
-          <a:bodyPr lIns="90000" rIns="90000" tIns="45000" bIns="45000" anchor="ctr"/>
+          <a:bodyPr lIns="90000" rIns="90000" tIns="45000" bIns="45000" anchor="ctr">
+            <a:noAutofit/>
+          </a:bodyPr>
           <a:p>
             <a:pPr algn="ctr">
               <a:lnSpc>
@@ -10267,7 +10378,7 @@
         <p:spPr>
           <a:xfrm>
             <a:off x="430920" y="3472920"/>
-            <a:ext cx="561960" cy="360"/>
+            <a:ext cx="561600" cy="360"/>
           </a:xfrm>
           <a:custGeom>
             <a:avLst/>
@@ -10310,7 +10421,7 @@
         <p:spPr>
           <a:xfrm>
             <a:off x="2057400" y="2729880"/>
-            <a:ext cx="983880" cy="455040"/>
+            <a:ext cx="983520" cy="454680"/>
           </a:xfrm>
           <a:prstGeom prst="rect">
             <a:avLst/>
@@ -10327,7 +10438,9 @@
           <a:fontRef idx="minor"/>
         </p:style>
         <p:txBody>
-          <a:bodyPr lIns="90000" rIns="90000" tIns="45000" bIns="45000"/>
+          <a:bodyPr lIns="90000" rIns="90000" tIns="45000" bIns="45000">
+            <a:noAutofit/>
+          </a:bodyPr>
           <a:p>
             <a:pPr>
               <a:lnSpc>
@@ -10380,7 +10493,7 @@
         <p:spPr>
           <a:xfrm>
             <a:off x="2699280" y="3085920"/>
-            <a:ext cx="1309320" cy="772920"/>
+            <a:ext cx="1308960" cy="772560"/>
           </a:xfrm>
           <a:prstGeom prst="roundRect">
             <a:avLst>
@@ -10404,7 +10517,9 @@
           <a:fontRef idx="minor"/>
         </p:style>
         <p:txBody>
-          <a:bodyPr lIns="90000" rIns="90000" tIns="45000" bIns="45000" anchor="ctr"/>
+          <a:bodyPr lIns="90000" rIns="90000" tIns="45000" bIns="45000" anchor="ctr">
+            <a:noAutofit/>
+          </a:bodyPr>
           <a:p>
             <a:pPr algn="ctr">
               <a:lnSpc>
@@ -10435,8 +10550,8 @@
         </p:nvSpPr>
         <p:spPr>
           <a:xfrm flipV="1">
-            <a:off x="2136600" y="3470760"/>
-            <a:ext cx="561960" cy="360"/>
+            <a:off x="2136600" y="3470040"/>
+            <a:ext cx="561600" cy="360"/>
           </a:xfrm>
           <a:custGeom>
             <a:avLst/>
@@ -10479,7 +10594,7 @@
         <p:spPr>
           <a:xfrm>
             <a:off x="2699280" y="4602960"/>
-            <a:ext cx="1309320" cy="772920"/>
+            <a:ext cx="1308960" cy="772560"/>
           </a:xfrm>
           <a:prstGeom prst="roundRect">
             <a:avLst>
@@ -10503,7 +10618,9 @@
           <a:fontRef idx="minor"/>
         </p:style>
         <p:txBody>
-          <a:bodyPr lIns="90000" rIns="90000" tIns="45000" bIns="45000" anchor="ctr"/>
+          <a:bodyPr lIns="90000" rIns="90000" tIns="45000" bIns="45000" anchor="ctr">
+            <a:noAutofit/>
+          </a:bodyPr>
           <a:p>
             <a:pPr algn="ctr">
               <a:lnSpc>
@@ -10535,7 +10652,7 @@
         <p:spPr>
           <a:xfrm>
             <a:off x="3354120" y="3859920"/>
-            <a:ext cx="360" cy="742320"/>
+            <a:ext cx="360" cy="741960"/>
           </a:xfrm>
           <a:custGeom>
             <a:avLst/>
@@ -10578,7 +10695,7 @@
         <p:spPr>
           <a:xfrm>
             <a:off x="3446640" y="4000680"/>
-            <a:ext cx="1828080" cy="455040"/>
+            <a:ext cx="1827720" cy="454680"/>
           </a:xfrm>
           <a:prstGeom prst="rect">
             <a:avLst/>
@@ -10595,7 +10712,9 @@
           <a:fontRef idx="minor"/>
         </p:style>
         <p:txBody>
-          <a:bodyPr lIns="90000" rIns="90000" tIns="45000" bIns="45000"/>
+          <a:bodyPr lIns="90000" rIns="90000" tIns="45000" bIns="45000">
+            <a:noAutofit/>
+          </a:bodyPr>
           <a:p>
             <a:pPr>
               <a:lnSpc>
@@ -10648,7 +10767,7 @@
         <p:spPr>
           <a:xfrm>
             <a:off x="5441040" y="5787720"/>
-            <a:ext cx="1309320" cy="772920"/>
+            <a:ext cx="1308960" cy="772560"/>
           </a:xfrm>
           <a:prstGeom prst="roundRect">
             <a:avLst>
@@ -10672,7 +10791,9 @@
           <a:fontRef idx="minor"/>
         </p:style>
         <p:txBody>
-          <a:bodyPr lIns="90000" rIns="90000" tIns="45000" bIns="45000" anchor="ctr"/>
+          <a:bodyPr lIns="90000" rIns="90000" tIns="45000" bIns="45000" anchor="ctr">
+            <a:noAutofit/>
+          </a:bodyPr>
           <a:p>
             <a:pPr algn="ctr">
               <a:lnSpc>
@@ -10703,8 +10824,8 @@
         </p:nvSpPr>
         <p:spPr>
           <a:xfrm flipH="1" rot="16200000">
-            <a:off x="4518720" y="4211280"/>
-            <a:ext cx="410400" cy="2741040"/>
+            <a:off x="4518360" y="4211280"/>
+            <a:ext cx="410040" cy="2740680"/>
           </a:xfrm>
           <a:prstGeom prst="curvedConnector3">
             <a:avLst>
@@ -10736,7 +10857,7 @@
         <p:spPr>
           <a:xfrm>
             <a:off x="4138200" y="4976640"/>
-            <a:ext cx="1828080" cy="455040"/>
+            <a:ext cx="1827720" cy="454680"/>
           </a:xfrm>
           <a:prstGeom prst="rect">
             <a:avLst/>
@@ -10753,7 +10874,9 @@
           <a:fontRef idx="minor"/>
         </p:style>
         <p:txBody>
-          <a:bodyPr lIns="90000" rIns="90000" tIns="45000" bIns="45000"/>
+          <a:bodyPr lIns="90000" rIns="90000" tIns="45000" bIns="45000">
+            <a:noAutofit/>
+          </a:bodyPr>
           <a:p>
             <a:pPr>
               <a:lnSpc>
@@ -10806,7 +10929,7 @@
         <p:spPr>
           <a:xfrm>
             <a:off x="5052600" y="3085920"/>
-            <a:ext cx="1321200" cy="772920"/>
+            <a:ext cx="1320840" cy="772560"/>
           </a:xfrm>
           <a:prstGeom prst="roundRect">
             <a:avLst>
@@ -10830,7 +10953,9 @@
           <a:fontRef idx="minor"/>
         </p:style>
         <p:txBody>
-          <a:bodyPr lIns="90000" rIns="90000" tIns="45000" bIns="45000" anchor="ctr"/>
+          <a:bodyPr lIns="90000" rIns="90000" tIns="45000" bIns="45000" anchor="ctr">
+            <a:noAutofit/>
+          </a:bodyPr>
           <a:p>
             <a:pPr algn="ctr">
               <a:lnSpc>
@@ -10862,7 +10987,7 @@
         <p:spPr>
           <a:xfrm>
             <a:off x="4009320" y="3472920"/>
-            <a:ext cx="1042560" cy="360"/>
+            <a:ext cx="1042200" cy="360"/>
           </a:xfrm>
           <a:custGeom>
             <a:avLst/>
@@ -10905,7 +11030,7 @@
         <p:spPr>
           <a:xfrm>
             <a:off x="3510360" y="2620080"/>
-            <a:ext cx="2280960" cy="636840"/>
+            <a:ext cx="2280600" cy="636480"/>
           </a:xfrm>
           <a:prstGeom prst="rect">
             <a:avLst/>
@@ -10922,7 +11047,9 @@
           <a:fontRef idx="minor"/>
         </p:style>
         <p:txBody>
-          <a:bodyPr lIns="90000" rIns="90000" tIns="45000" bIns="45000"/>
+          <a:bodyPr lIns="90000" rIns="90000" tIns="45000" bIns="45000">
+            <a:noAutofit/>
+          </a:bodyPr>
           <a:p>
             <a:pPr>
               <a:lnSpc>
@@ -10975,7 +11102,7 @@
         <p:spPr>
           <a:xfrm>
             <a:off x="7102080" y="3085920"/>
-            <a:ext cx="1321200" cy="772920"/>
+            <a:ext cx="1320840" cy="772560"/>
           </a:xfrm>
           <a:prstGeom prst="roundRect">
             <a:avLst>
@@ -10999,7 +11126,9 @@
           <a:fontRef idx="minor"/>
         </p:style>
         <p:txBody>
-          <a:bodyPr lIns="90000" rIns="90000" tIns="45000" bIns="45000" anchor="ctr"/>
+          <a:bodyPr lIns="90000" rIns="90000" tIns="45000" bIns="45000" anchor="ctr">
+            <a:noAutofit/>
+          </a:bodyPr>
           <a:p>
             <a:pPr algn="ctr">
               <a:lnSpc>
@@ -11031,7 +11160,7 @@
         <p:spPr>
           <a:xfrm>
             <a:off x="7102080" y="1874880"/>
-            <a:ext cx="1321200" cy="772920"/>
+            <a:ext cx="1320840" cy="772560"/>
           </a:xfrm>
           <a:prstGeom prst="roundRect">
             <a:avLst>
@@ -11055,7 +11184,9 @@
           <a:fontRef idx="minor"/>
         </p:style>
         <p:txBody>
-          <a:bodyPr lIns="90000" rIns="90000" tIns="45000" bIns="45000" anchor="ctr"/>
+          <a:bodyPr lIns="90000" rIns="90000" tIns="45000" bIns="45000" anchor="ctr">
+            <a:noAutofit/>
+          </a:bodyPr>
           <a:p>
             <a:pPr algn="ctr">
               <a:lnSpc>
@@ -11086,8 +11217,8 @@
         </p:nvSpPr>
         <p:spPr>
           <a:xfrm flipV="1">
-            <a:off x="6374520" y="3470760"/>
-            <a:ext cx="726840" cy="360"/>
+            <a:off x="6374520" y="3470040"/>
+            <a:ext cx="726480" cy="360"/>
           </a:xfrm>
           <a:custGeom>
             <a:avLst/>
@@ -11130,7 +11261,7 @@
         <p:spPr>
           <a:xfrm flipV="1">
             <a:off x="7763040" y="2648160"/>
-            <a:ext cx="360" cy="436680"/>
+            <a:ext cx="360" cy="436320"/>
           </a:xfrm>
           <a:custGeom>
             <a:avLst/>
@@ -11173,7 +11304,7 @@
         <p:spPr>
           <a:xfrm flipV="1">
             <a:off x="7763040" y="1141200"/>
-            <a:ext cx="360" cy="732600"/>
+            <a:ext cx="360" cy="732240"/>
           </a:xfrm>
           <a:custGeom>
             <a:avLst/>
@@ -11215,8 +11346,8 @@
         </p:nvSpPr>
         <p:spPr>
           <a:xfrm flipH="1">
-            <a:off x="6094440" y="3859920"/>
-            <a:ext cx="1666080" cy="1927080"/>
+            <a:off x="6093720" y="3859920"/>
+            <a:ext cx="1665720" cy="1926720"/>
           </a:xfrm>
           <a:custGeom>
             <a:avLst/>
@@ -11259,7 +11390,7 @@
         <p:spPr>
           <a:xfrm>
             <a:off x="5784480" y="4297320"/>
-            <a:ext cx="1977480" cy="455040"/>
+            <a:ext cx="1977120" cy="454680"/>
           </a:xfrm>
           <a:prstGeom prst="rect">
             <a:avLst/>
@@ -11276,7 +11407,9 @@
           <a:fontRef idx="minor"/>
         </p:style>
         <p:txBody>
-          <a:bodyPr lIns="90000" rIns="90000" tIns="45000" bIns="45000"/>
+          <a:bodyPr lIns="90000" rIns="90000" tIns="45000" bIns="45000">
+            <a:noAutofit/>
+          </a:bodyPr>
           <a:p>
             <a:pPr>
               <a:lnSpc>
@@ -11329,7 +11462,7 @@
         <p:spPr>
           <a:xfrm>
             <a:off x="6318000" y="2727720"/>
-            <a:ext cx="983880" cy="455040"/>
+            <a:ext cx="983520" cy="454680"/>
           </a:xfrm>
           <a:prstGeom prst="rect">
             <a:avLst/>
@@ -11346,7 +11479,9 @@
           <a:fontRef idx="minor"/>
         </p:style>
         <p:txBody>
-          <a:bodyPr lIns="90000" rIns="90000" tIns="45000" bIns="45000"/>
+          <a:bodyPr lIns="90000" rIns="90000" tIns="45000" bIns="45000">
+            <a:noAutofit/>
+          </a:bodyPr>
           <a:p>
             <a:pPr>
               <a:lnSpc>
@@ -11399,7 +11534,7 @@
         <p:spPr>
           <a:xfrm>
             <a:off x="7102080" y="368280"/>
-            <a:ext cx="1321200" cy="772920"/>
+            <a:ext cx="1320840" cy="772560"/>
           </a:xfrm>
           <a:prstGeom prst="roundRect">
             <a:avLst>
@@ -11423,7 +11558,9 @@
           <a:fontRef idx="minor"/>
         </p:style>
         <p:txBody>
-          <a:bodyPr lIns="90000" rIns="90000" tIns="45000" bIns="45000" anchor="ctr"/>
+          <a:bodyPr lIns="90000" rIns="90000" tIns="45000" bIns="45000" anchor="ctr">
+            <a:noAutofit/>
+          </a:bodyPr>
           <a:p>
             <a:pPr algn="ctr">
               <a:lnSpc>
@@ -11455,7 +11592,7 @@
         <p:spPr>
           <a:xfrm>
             <a:off x="7791480" y="2652840"/>
-            <a:ext cx="1617120" cy="636840"/>
+            <a:ext cx="1616760" cy="636480"/>
           </a:xfrm>
           <a:prstGeom prst="rect">
             <a:avLst/>
@@ -11472,7 +11609,9 @@
           <a:fontRef idx="minor"/>
         </p:style>
         <p:txBody>
-          <a:bodyPr lIns="90000" rIns="90000" tIns="45000" bIns="45000"/>
+          <a:bodyPr lIns="90000" rIns="90000" tIns="45000" bIns="45000">
+            <a:noAutofit/>
+          </a:bodyPr>
           <a:p>
             <a:pPr>
               <a:lnSpc>
@@ -11525,7 +11664,7 @@
         <p:spPr>
           <a:xfrm>
             <a:off x="7791480" y="1266120"/>
-            <a:ext cx="1978920" cy="455040"/>
+            <a:ext cx="1978560" cy="454680"/>
           </a:xfrm>
           <a:prstGeom prst="rect">
             <a:avLst/>
@@ -11542,7 +11681,9 @@
           <a:fontRef idx="minor"/>
         </p:style>
         <p:txBody>
-          <a:bodyPr lIns="90000" rIns="90000" tIns="45000" bIns="45000"/>
+          <a:bodyPr lIns="90000" rIns="90000" tIns="45000" bIns="45000">
+            <a:noAutofit/>
+          </a:bodyPr>
           <a:p>
             <a:pPr>
               <a:lnSpc>
@@ -11586,7 +11727,7 @@
         <p:spPr>
           <a:xfrm>
             <a:off x="4501800" y="419760"/>
-            <a:ext cx="2599560" cy="819360"/>
+            <a:ext cx="2599200" cy="819000"/>
           </a:xfrm>
           <a:prstGeom prst="rect">
             <a:avLst/>
@@ -11603,7 +11744,9 @@
           <a:fontRef idx="minor"/>
         </p:style>
         <p:txBody>
-          <a:bodyPr lIns="90000" rIns="90000" tIns="45000" bIns="45000"/>
+          <a:bodyPr lIns="90000" rIns="90000" tIns="45000" bIns="45000">
+            <a:noAutofit/>
+          </a:bodyPr>
           <a:p>
             <a:pPr>
               <a:lnSpc>
@@ -11635,7 +11778,7 @@
         <p:spPr>
           <a:xfrm>
             <a:off x="9417240" y="1876680"/>
-            <a:ext cx="1321200" cy="772920"/>
+            <a:ext cx="1320840" cy="772560"/>
           </a:xfrm>
           <a:prstGeom prst="roundRect">
             <a:avLst>
@@ -11659,7 +11802,9 @@
           <a:fontRef idx="minor"/>
         </p:style>
         <p:txBody>
-          <a:bodyPr lIns="90000" rIns="90000" tIns="45000" bIns="45000" anchor="ctr"/>
+          <a:bodyPr lIns="90000" rIns="90000" tIns="45000" bIns="45000" anchor="ctr">
+            <a:noAutofit/>
+          </a:bodyPr>
           <a:p>
             <a:pPr algn="ctr">
               <a:lnSpc>
@@ -11691,7 +11836,7 @@
         <p:spPr>
           <a:xfrm>
             <a:off x="8423640" y="754920"/>
-            <a:ext cx="1653840" cy="1121040"/>
+            <a:ext cx="1653480" cy="1120680"/>
           </a:xfrm>
           <a:prstGeom prst="curvedConnector2">
             <a:avLst/>
@@ -11721,7 +11866,7 @@
         <p:spPr>
           <a:xfrm>
             <a:off x="8694720" y="363600"/>
-            <a:ext cx="1866240" cy="636840"/>
+            <a:ext cx="1865880" cy="636480"/>
           </a:xfrm>
           <a:prstGeom prst="rect">
             <a:avLst/>
@@ -11738,7 +11883,9 @@
           <a:fontRef idx="minor"/>
         </p:style>
         <p:txBody>
-          <a:bodyPr lIns="90000" rIns="90000" tIns="45000" bIns="45000"/>
+          <a:bodyPr lIns="90000" rIns="90000" tIns="45000" bIns="45000">
+            <a:noAutofit/>
+          </a:bodyPr>
           <a:p>
             <a:pPr>
               <a:lnSpc>
@@ -11782,7 +11929,7 @@
         <p:spPr>
           <a:xfrm>
             <a:off x="9419400" y="3506040"/>
-            <a:ext cx="1321200" cy="772920"/>
+            <a:ext cx="1320840" cy="772560"/>
           </a:xfrm>
           <a:prstGeom prst="roundRect">
             <a:avLst>
@@ -11806,7 +11953,9 @@
           <a:fontRef idx="minor"/>
         </p:style>
         <p:txBody>
-          <a:bodyPr lIns="90000" rIns="90000" tIns="45000" bIns="45000" anchor="ctr"/>
+          <a:bodyPr lIns="90000" rIns="90000" tIns="45000" bIns="45000" anchor="ctr">
+            <a:noAutofit/>
+          </a:bodyPr>
           <a:p>
             <a:pPr algn="ctr">
               <a:lnSpc>
@@ -11838,7 +11987,7 @@
         <p:spPr>
           <a:xfrm>
             <a:off x="10078200" y="2650320"/>
-            <a:ext cx="1440" cy="854640"/>
+            <a:ext cx="1080" cy="854280"/>
           </a:xfrm>
           <a:custGeom>
             <a:avLst/>
@@ -11880,8 +12029,8 @@
         </p:nvSpPr>
         <p:spPr>
           <a:xfrm flipH="1" rot="16200000">
-            <a:off x="10214280" y="1739520"/>
-            <a:ext cx="386280" cy="660240"/>
+            <a:off x="10213920" y="1739520"/>
+            <a:ext cx="385920" cy="659880"/>
           </a:xfrm>
           <a:prstGeom prst="curvedConnector4">
             <a:avLst>
@@ -11914,7 +12063,7 @@
         <p:spPr>
           <a:xfrm>
             <a:off x="10361160" y="927360"/>
-            <a:ext cx="1499040" cy="455040"/>
+            <a:ext cx="1498680" cy="454680"/>
           </a:xfrm>
           <a:prstGeom prst="rect">
             <a:avLst/>
@@ -11931,7 +12080,9 @@
           <a:fontRef idx="minor"/>
         </p:style>
         <p:txBody>
-          <a:bodyPr lIns="90000" rIns="90000" tIns="45000" bIns="45000"/>
+          <a:bodyPr lIns="90000" rIns="90000" tIns="45000" bIns="45000">
+            <a:noAutofit/>
+          </a:bodyPr>
           <a:p>
             <a:pPr>
               <a:lnSpc>
@@ -11984,7 +12135,7 @@
         <p:spPr>
           <a:xfrm>
             <a:off x="10134720" y="2883960"/>
-            <a:ext cx="1494720" cy="455040"/>
+            <a:ext cx="1494360" cy="454680"/>
           </a:xfrm>
           <a:prstGeom prst="rect">
             <a:avLst/>
@@ -12001,7 +12152,9 @@
           <a:fontRef idx="minor"/>
         </p:style>
         <p:txBody>
-          <a:bodyPr lIns="90000" rIns="90000" tIns="45000" bIns="45000"/>
+          <a:bodyPr lIns="90000" rIns="90000" tIns="45000" bIns="45000">
+            <a:noAutofit/>
+          </a:bodyPr>
           <a:p>
             <a:pPr>
               <a:lnSpc>
@@ -12054,7 +12207,7 @@
         <p:spPr>
           <a:xfrm>
             <a:off x="7891920" y="4462200"/>
-            <a:ext cx="3968280" cy="819360"/>
+            <a:ext cx="3967920" cy="819000"/>
           </a:xfrm>
           <a:prstGeom prst="rect">
             <a:avLst/>
@@ -12071,7 +12224,9 @@
           <a:fontRef idx="minor"/>
         </p:style>
         <p:txBody>
-          <a:bodyPr lIns="90000" rIns="90000" tIns="45000" bIns="45000"/>
+          <a:bodyPr lIns="90000" rIns="90000" tIns="45000" bIns="45000">
+            <a:noAutofit/>
+          </a:bodyPr>
           <a:p>
             <a:pPr>
               <a:lnSpc>
@@ -12104,33 +12259,6 @@
       <p:transition spd="slow"/>
     </mc:Fallback>
   </mc:AlternateContent>
-  <p:timing>
-    <p:tnLst>
-      <p:par>
-        <p:cTn id="7" dur="indefinite" restart="never" nodeType="tmRoot">
-          <p:childTnLst>
-            <p:seq>
-              <p:cTn id="8" dur="indefinite" nodeType="mainSeq"/>
-              <p:prevCondLst>
-                <p:cond delay="0" evt="onPrev">
-                  <p:tgtEl>
-                    <p:sldTgt/>
-                  </p:tgtEl>
-                </p:cond>
-              </p:prevCondLst>
-              <p:nextCondLst>
-                <p:cond delay="0" evt="onNext">
-                  <p:tgtEl>
-                    <p:sldTgt/>
-                  </p:tgtEl>
-                </p:cond>
-              </p:nextCondLst>
-            </p:seq>
-          </p:childTnLst>
-        </p:cTn>
-      </p:par>
-    </p:tnLst>
-  </p:timing>
 </p:sld>
 </file>
 
@@ -12160,7 +12288,7 @@
         <p:spPr>
           <a:xfrm>
             <a:off x="162000" y="3314880"/>
-            <a:ext cx="408960" cy="389880"/>
+            <a:ext cx="408600" cy="389520"/>
           </a:xfrm>
           <a:prstGeom prst="ellipse">
             <a:avLst/>
@@ -12191,7 +12319,7 @@
         <p:spPr>
           <a:xfrm>
             <a:off x="876240" y="3075840"/>
-            <a:ext cx="1823400" cy="880200"/>
+            <a:ext cx="1823040" cy="879840"/>
           </a:xfrm>
           <a:prstGeom prst="roundRect">
             <a:avLst>
@@ -12215,7 +12343,9 @@
           <a:fontRef idx="minor"/>
         </p:style>
         <p:txBody>
-          <a:bodyPr lIns="90000" rIns="90000" tIns="45000" bIns="45000" anchor="ctr"/>
+          <a:bodyPr lIns="90000" rIns="90000" tIns="45000" bIns="45000" anchor="ctr">
+            <a:noAutofit/>
+          </a:bodyPr>
           <a:p>
             <a:pPr algn="ctr">
               <a:lnSpc>
@@ -12247,7 +12377,7 @@
         <p:spPr>
           <a:xfrm>
             <a:off x="5581800" y="3697560"/>
-            <a:ext cx="1468800" cy="880200"/>
+            <a:ext cx="1468440" cy="879840"/>
           </a:xfrm>
           <a:prstGeom prst="roundRect">
             <a:avLst>
@@ -12271,7 +12401,9 @@
           <a:fontRef idx="minor"/>
         </p:style>
         <p:txBody>
-          <a:bodyPr lIns="90000" rIns="90000" tIns="45000" bIns="45000" anchor="ctr"/>
+          <a:bodyPr lIns="90000" rIns="90000" tIns="45000" bIns="45000" anchor="ctr">
+            <a:noAutofit/>
+          </a:bodyPr>
           <a:p>
             <a:pPr algn="ctr">
               <a:lnSpc>
@@ -12303,7 +12435,7 @@
         <p:spPr>
           <a:xfrm>
             <a:off x="3057480" y="3075840"/>
-            <a:ext cx="1823400" cy="880200"/>
+            <a:ext cx="1823040" cy="879840"/>
           </a:xfrm>
           <a:prstGeom prst="roundRect">
             <a:avLst>
@@ -12327,7 +12459,9 @@
           <a:fontRef idx="minor"/>
         </p:style>
         <p:txBody>
-          <a:bodyPr lIns="90000" rIns="90000" tIns="45000" bIns="45000" anchor="ctr"/>
+          <a:bodyPr lIns="90000" rIns="90000" tIns="45000" bIns="45000" anchor="ctr">
+            <a:noAutofit/>
+          </a:bodyPr>
           <a:p>
             <a:pPr algn="ctr">
               <a:lnSpc>
@@ -12358,8 +12492,8 @@
         </p:nvSpPr>
         <p:spPr>
           <a:xfrm flipV="1" rot="16200000">
-            <a:off x="2879640" y="1984320"/>
-            <a:ext cx="11880" cy="2180520"/>
+            <a:off x="2880000" y="1984320"/>
+            <a:ext cx="11520" cy="2180160"/>
           </a:xfrm>
           <a:prstGeom prst="curvedConnector3">
             <a:avLst>
@@ -12391,7 +12525,7 @@
         <p:spPr>
           <a:xfrm>
             <a:off x="2700360" y="3516480"/>
-            <a:ext cx="356760" cy="360"/>
+            <a:ext cx="356400" cy="360"/>
           </a:xfrm>
           <a:custGeom>
             <a:avLst/>
@@ -12434,7 +12568,7 @@
         <p:spPr>
           <a:xfrm>
             <a:off x="5581800" y="2284920"/>
-            <a:ext cx="1468800" cy="880200"/>
+            <a:ext cx="1468440" cy="879840"/>
           </a:xfrm>
           <a:prstGeom prst="roundRect">
             <a:avLst>
@@ -12458,7 +12592,9 @@
           <a:fontRef idx="minor"/>
         </p:style>
         <p:txBody>
-          <a:bodyPr lIns="90000" rIns="90000" tIns="45000" bIns="45000" anchor="ctr"/>
+          <a:bodyPr lIns="90000" rIns="90000" tIns="45000" bIns="45000" anchor="ctr">
+            <a:noAutofit/>
+          </a:bodyPr>
           <a:p>
             <a:pPr algn="ctr">
               <a:lnSpc>
@@ -12490,7 +12626,7 @@
         <p:spPr>
           <a:xfrm>
             <a:off x="5581800" y="5110200"/>
-            <a:ext cx="1468800" cy="880200"/>
+            <a:ext cx="1468440" cy="879840"/>
           </a:xfrm>
           <a:prstGeom prst="roundRect">
             <a:avLst>
@@ -12514,7 +12650,9 @@
           <a:fontRef idx="minor"/>
         </p:style>
         <p:txBody>
-          <a:bodyPr lIns="90000" rIns="90000" tIns="45000" bIns="45000" anchor="ctr"/>
+          <a:bodyPr lIns="90000" rIns="90000" tIns="45000" bIns="45000" anchor="ctr">
+            <a:noAutofit/>
+          </a:bodyPr>
           <a:p>
             <a:pPr algn="ctr">
               <a:lnSpc>
@@ -12546,7 +12684,7 @@
         <p:spPr>
           <a:xfrm>
             <a:off x="5581800" y="872280"/>
-            <a:ext cx="1468800" cy="880200"/>
+            <a:ext cx="1468440" cy="879840"/>
           </a:xfrm>
           <a:prstGeom prst="roundRect">
             <a:avLst>
@@ -12570,7 +12708,9 @@
           <a:fontRef idx="minor"/>
         </p:style>
         <p:txBody>
-          <a:bodyPr lIns="90000" rIns="90000" tIns="45000" bIns="45000" anchor="ctr"/>
+          <a:bodyPr lIns="90000" rIns="90000" tIns="45000" bIns="45000" anchor="ctr">
+            <a:noAutofit/>
+          </a:bodyPr>
           <a:p>
             <a:pPr algn="ctr">
               <a:lnSpc>
@@ -12601,8 +12741,8 @@
         </p:nvSpPr>
         <p:spPr>
           <a:xfrm flipV="1">
-            <a:off x="4881600" y="1312200"/>
-            <a:ext cx="699480" cy="2202840"/>
+            <a:off x="4881600" y="1311840"/>
+            <a:ext cx="699120" cy="2202480"/>
           </a:xfrm>
           <a:prstGeom prst="curvedConnector3">
             <a:avLst>
@@ -12633,8 +12773,8 @@
         </p:nvSpPr>
         <p:spPr>
           <a:xfrm flipV="1">
-            <a:off x="4881600" y="2724840"/>
-            <a:ext cx="699480" cy="790200"/>
+            <a:off x="4881600" y="2724480"/>
+            <a:ext cx="699120" cy="789840"/>
           </a:xfrm>
           <a:prstGeom prst="curvedConnector3">
             <a:avLst>
@@ -12666,7 +12806,7 @@
         <p:spPr>
           <a:xfrm>
             <a:off x="4881600" y="3516480"/>
-            <a:ext cx="699480" cy="621000"/>
+            <a:ext cx="699120" cy="620640"/>
           </a:xfrm>
           <a:prstGeom prst="curvedConnector3">
             <a:avLst>
@@ -12698,7 +12838,7 @@
         <p:spPr>
           <a:xfrm>
             <a:off x="4881600" y="3516480"/>
-            <a:ext cx="699480" cy="2033640"/>
+            <a:ext cx="699120" cy="2033280"/>
           </a:xfrm>
           <a:prstGeom prst="curvedConnector3">
             <a:avLst>
@@ -12730,7 +12870,7 @@
         <p:spPr>
           <a:xfrm>
             <a:off x="571320" y="3510000"/>
-            <a:ext cx="304200" cy="5760"/>
+            <a:ext cx="303840" cy="5400"/>
           </a:xfrm>
           <a:custGeom>
             <a:avLst/>
@@ -12773,7 +12913,7 @@
         <p:spPr>
           <a:xfrm>
             <a:off x="3348360" y="1291680"/>
-            <a:ext cx="2064240" cy="636840"/>
+            <a:ext cx="2063880" cy="636480"/>
           </a:xfrm>
           <a:prstGeom prst="rect">
             <a:avLst/>
@@ -12790,7 +12930,9 @@
           <a:fontRef idx="minor"/>
         </p:style>
         <p:txBody>
-          <a:bodyPr lIns="90000" rIns="90000" tIns="45000" bIns="45000"/>
+          <a:bodyPr lIns="90000" rIns="90000" tIns="45000" bIns="45000">
+            <a:noAutofit/>
+          </a:bodyPr>
           <a:p>
             <a:pPr>
               <a:lnSpc>
@@ -12843,7 +12985,7 @@
         <p:spPr>
           <a:xfrm>
             <a:off x="3871800" y="4029120"/>
-            <a:ext cx="1915920" cy="819360"/>
+            <a:ext cx="1915560" cy="819000"/>
           </a:xfrm>
           <a:prstGeom prst="rect">
             <a:avLst/>
@@ -12860,7 +13002,9 @@
           <a:fontRef idx="minor"/>
         </p:style>
         <p:txBody>
-          <a:bodyPr lIns="90000" rIns="90000" tIns="45000" bIns="45000"/>
+          <a:bodyPr lIns="90000" rIns="90000" tIns="45000" bIns="45000">
+            <a:noAutofit/>
+          </a:bodyPr>
           <a:p>
             <a:pPr>
               <a:lnSpc>
@@ -12904,7 +13048,7 @@
         <p:spPr>
           <a:xfrm>
             <a:off x="3923280" y="2524680"/>
-            <a:ext cx="1915920" cy="636840"/>
+            <a:ext cx="1915560" cy="636480"/>
           </a:xfrm>
           <a:prstGeom prst="rect">
             <a:avLst/>
@@ -12921,7 +13065,9 @@
           <a:fontRef idx="minor"/>
         </p:style>
         <p:txBody>
-          <a:bodyPr lIns="90000" rIns="90000" tIns="45000" bIns="45000"/>
+          <a:bodyPr lIns="90000" rIns="90000" tIns="45000" bIns="45000">
+            <a:noAutofit/>
+          </a:bodyPr>
           <a:p>
             <a:pPr>
               <a:lnSpc>
@@ -12965,7 +13111,7 @@
         <p:spPr>
           <a:xfrm>
             <a:off x="3767760" y="5088960"/>
-            <a:ext cx="2124000" cy="636840"/>
+            <a:ext cx="2123640" cy="636480"/>
           </a:xfrm>
           <a:prstGeom prst="rect">
             <a:avLst/>
@@ -12982,7 +13128,9 @@
           <a:fontRef idx="minor"/>
         </p:style>
         <p:txBody>
-          <a:bodyPr lIns="90000" rIns="90000" tIns="45000" bIns="45000"/>
+          <a:bodyPr lIns="90000" rIns="90000" tIns="45000" bIns="45000">
+            <a:noAutofit/>
+          </a:bodyPr>
           <a:p>
             <a:pPr>
               <a:lnSpc>
@@ -13025,8 +13173,8 @@
         </p:nvSpPr>
         <p:spPr>
           <a:xfrm flipV="1">
-            <a:off x="7051320" y="4124160"/>
-            <a:ext cx="917640" cy="1424160"/>
+            <a:off x="7051320" y="4123440"/>
+            <a:ext cx="917280" cy="1423800"/>
           </a:xfrm>
           <a:prstGeom prst="curvedConnector3">
             <a:avLst>
@@ -13058,7 +13206,7 @@
         <p:spPr>
           <a:xfrm>
             <a:off x="7051320" y="2725560"/>
-            <a:ext cx="917640" cy="1399320"/>
+            <a:ext cx="917280" cy="1398960"/>
           </a:xfrm>
           <a:prstGeom prst="curvedConnector3">
             <a:avLst>
@@ -13089,8 +13237,8 @@
         </p:nvSpPr>
         <p:spPr>
           <a:xfrm flipV="1">
-            <a:off x="7051320" y="4124160"/>
-            <a:ext cx="917640" cy="11520"/>
+            <a:off x="7051320" y="4123440"/>
+            <a:ext cx="917280" cy="11160"/>
           </a:xfrm>
           <a:prstGeom prst="curvedConnector3">
             <a:avLst>
@@ -13122,7 +13270,7 @@
         <p:spPr>
           <a:xfrm>
             <a:off x="1656720" y="2338920"/>
-            <a:ext cx="2443680" cy="636840"/>
+            <a:ext cx="2443320" cy="636480"/>
           </a:xfrm>
           <a:prstGeom prst="rect">
             <a:avLst/>
@@ -13139,7 +13287,9 @@
           <a:fontRef idx="minor"/>
         </p:style>
         <p:txBody>
-          <a:bodyPr lIns="90000" rIns="90000" tIns="45000" bIns="45000"/>
+          <a:bodyPr lIns="90000" rIns="90000" tIns="45000" bIns="45000">
+            <a:noAutofit/>
+          </a:bodyPr>
           <a:p>
             <a:pPr>
               <a:lnSpc>
@@ -13183,7 +13333,7 @@
         <p:spPr>
           <a:xfrm>
             <a:off x="7970040" y="3509280"/>
-            <a:ext cx="1604160" cy="1232280"/>
+            <a:ext cx="1603800" cy="1231920"/>
           </a:xfrm>
           <a:prstGeom prst="ellipse">
             <a:avLst/>
@@ -13205,7 +13355,9 @@
           <a:fontRef idx="minor"/>
         </p:style>
         <p:txBody>
-          <a:bodyPr lIns="90000" rIns="90000" tIns="45000" bIns="45000" anchor="ctr"/>
+          <a:bodyPr lIns="90000" rIns="90000" tIns="45000" bIns="45000" anchor="ctr">
+            <a:noAutofit/>
+          </a:bodyPr>
           <a:p>
             <a:pPr algn="ctr">
               <a:lnSpc>
@@ -13247,7 +13399,7 @@
         <p:spPr>
           <a:xfrm>
             <a:off x="7510680" y="2986200"/>
-            <a:ext cx="2095200" cy="455040"/>
+            <a:ext cx="2094840" cy="454680"/>
           </a:xfrm>
           <a:prstGeom prst="rect">
             <a:avLst/>
@@ -13264,7 +13416,9 @@
           <a:fontRef idx="minor"/>
         </p:style>
         <p:txBody>
-          <a:bodyPr lIns="90000" rIns="90000" tIns="45000" bIns="45000"/>
+          <a:bodyPr lIns="90000" rIns="90000" tIns="45000" bIns="45000">
+            <a:noAutofit/>
+          </a:bodyPr>
           <a:p>
             <a:pPr>
               <a:lnSpc>
@@ -13308,7 +13462,7 @@
         <p:spPr>
           <a:xfrm>
             <a:off x="7140600" y="918360"/>
-            <a:ext cx="3024000" cy="1001880"/>
+            <a:ext cx="3023640" cy="1001520"/>
           </a:xfrm>
           <a:prstGeom prst="rect">
             <a:avLst/>
@@ -13325,7 +13479,9 @@
           <a:fontRef idx="minor"/>
         </p:style>
         <p:txBody>
-          <a:bodyPr lIns="90000" rIns="90000" tIns="45000" bIns="45000"/>
+          <a:bodyPr lIns="90000" rIns="90000" tIns="45000" bIns="45000">
+            <a:noAutofit/>
+          </a:bodyPr>
           <a:p>
             <a:pPr>
               <a:lnSpc>
@@ -13358,33 +13514,6 @@
       <p:transition spd="slow"/>
     </mc:Fallback>
   </mc:AlternateContent>
-  <p:timing>
-    <p:tnLst>
-      <p:par>
-        <p:cTn id="9" dur="indefinite" restart="never" nodeType="tmRoot">
-          <p:childTnLst>
-            <p:seq>
-              <p:cTn id="10" dur="indefinite" nodeType="mainSeq"/>
-              <p:prevCondLst>
-                <p:cond delay="0" evt="onPrev">
-                  <p:tgtEl>
-                    <p:sldTgt/>
-                  </p:tgtEl>
-                </p:cond>
-              </p:prevCondLst>
-              <p:nextCondLst>
-                <p:cond delay="0" evt="onNext">
-                  <p:tgtEl>
-                    <p:sldTgt/>
-                  </p:tgtEl>
-                </p:cond>
-              </p:nextCondLst>
-            </p:seq>
-          </p:childTnLst>
-        </p:cTn>
-      </p:par>
-    </p:tnLst>
-  </p:timing>
 </p:sld>
 </file>
 
@@ -13414,7 +13543,7 @@
         <p:spPr>
           <a:xfrm>
             <a:off x="254880" y="1037520"/>
-            <a:ext cx="368640" cy="315720"/>
+            <a:ext cx="368280" cy="315360"/>
           </a:xfrm>
           <a:prstGeom prst="ellipse">
             <a:avLst/>
@@ -13445,7 +13574,7 @@
         <p:spPr>
           <a:xfrm>
             <a:off x="1310040" y="799920"/>
-            <a:ext cx="1801800" cy="808200"/>
+            <a:ext cx="1801440" cy="807840"/>
           </a:xfrm>
           <a:prstGeom prst="roundRect">
             <a:avLst>
@@ -13469,7 +13598,9 @@
           <a:fontRef idx="minor"/>
         </p:style>
         <p:txBody>
-          <a:bodyPr lIns="90000" rIns="90000" tIns="45000" bIns="45000" anchor="ctr"/>
+          <a:bodyPr lIns="90000" rIns="90000" tIns="45000" bIns="45000" anchor="ctr">
+            <a:noAutofit/>
+          </a:bodyPr>
           <a:p>
             <a:pPr algn="ctr">
               <a:lnSpc>
@@ -13500,8 +13631,8 @@
         </p:nvSpPr>
         <p:spPr>
           <a:xfrm flipV="1">
-            <a:off x="624240" y="1202400"/>
-            <a:ext cx="685080" cy="360"/>
+            <a:off x="624240" y="1201320"/>
+            <a:ext cx="684720" cy="360"/>
           </a:xfrm>
           <a:custGeom>
             <a:avLst/>
@@ -13544,7 +13675,7 @@
         <p:spPr>
           <a:xfrm>
             <a:off x="3798360" y="799920"/>
-            <a:ext cx="1696320" cy="808200"/>
+            <a:ext cx="1695960" cy="807840"/>
           </a:xfrm>
           <a:prstGeom prst="roundRect">
             <a:avLst>
@@ -13568,7 +13699,9 @@
           <a:fontRef idx="minor"/>
         </p:style>
         <p:txBody>
-          <a:bodyPr lIns="90000" rIns="90000" tIns="45000" bIns="45000" anchor="ctr"/>
+          <a:bodyPr lIns="90000" rIns="90000" tIns="45000" bIns="45000" anchor="ctr">
+            <a:noAutofit/>
+          </a:bodyPr>
           <a:p>
             <a:pPr algn="ctr">
               <a:lnSpc>
@@ -13600,7 +13733,7 @@
         <p:spPr>
           <a:xfrm>
             <a:off x="3112560" y="1204560"/>
-            <a:ext cx="685080" cy="360"/>
+            <a:ext cx="684720" cy="360"/>
           </a:xfrm>
           <a:custGeom>
             <a:avLst/>
@@ -13643,7 +13776,7 @@
         <p:spPr>
           <a:xfrm>
             <a:off x="6180840" y="1608840"/>
-            <a:ext cx="1696320" cy="808200"/>
+            <a:ext cx="1695960" cy="807840"/>
           </a:xfrm>
           <a:prstGeom prst="roundRect">
             <a:avLst>
@@ -13667,7 +13800,9 @@
           <a:fontRef idx="minor"/>
         </p:style>
         <p:txBody>
-          <a:bodyPr lIns="90000" rIns="90000" tIns="45000" bIns="45000" anchor="ctr"/>
+          <a:bodyPr lIns="90000" rIns="90000" tIns="45000" bIns="45000" anchor="ctr">
+            <a:noAutofit/>
+          </a:bodyPr>
           <a:p>
             <a:pPr algn="ctr">
               <a:lnSpc>
@@ -13699,7 +13834,7 @@
         <p:spPr>
           <a:xfrm>
             <a:off x="5495040" y="1204560"/>
-            <a:ext cx="685080" cy="808200"/>
+            <a:ext cx="684720" cy="807840"/>
           </a:xfrm>
           <a:prstGeom prst="curvedConnector3">
             <a:avLst>
@@ -13731,7 +13866,7 @@
         <p:spPr>
           <a:xfrm>
             <a:off x="8563680" y="1569600"/>
-            <a:ext cx="1696320" cy="887400"/>
+            <a:ext cx="1695960" cy="887040"/>
           </a:xfrm>
           <a:prstGeom prst="roundRect">
             <a:avLst>
@@ -13755,7 +13890,9 @@
           <a:fontRef idx="minor"/>
         </p:style>
         <p:txBody>
-          <a:bodyPr lIns="90000" rIns="90000" tIns="45000" bIns="45000" anchor="ctr"/>
+          <a:bodyPr lIns="90000" rIns="90000" tIns="45000" bIns="45000" anchor="ctr">
+            <a:noAutofit/>
+          </a:bodyPr>
           <a:p>
             <a:pPr algn="ctr">
               <a:lnSpc>
@@ -13786,8 +13923,8 @@
         </p:nvSpPr>
         <p:spPr>
           <a:xfrm flipV="1">
-            <a:off x="7877880" y="2011320"/>
-            <a:ext cx="685080" cy="360"/>
+            <a:off x="7877880" y="2010240"/>
+            <a:ext cx="684720" cy="360"/>
           </a:xfrm>
           <a:custGeom>
             <a:avLst/>
@@ -13830,7 +13967,7 @@
         <p:spPr>
           <a:xfrm>
             <a:off x="1758600" y="227880"/>
-            <a:ext cx="4193280" cy="636840"/>
+            <a:ext cx="4192920" cy="636480"/>
           </a:xfrm>
           <a:prstGeom prst="rect">
             <a:avLst/>
@@ -13847,7 +13984,9 @@
           <a:fontRef idx="minor"/>
         </p:style>
         <p:txBody>
-          <a:bodyPr lIns="90000" rIns="90000" tIns="45000" bIns="45000"/>
+          <a:bodyPr lIns="90000" rIns="90000" tIns="45000" bIns="45000">
+            <a:noAutofit/>
+          </a:bodyPr>
           <a:p>
             <a:pPr>
               <a:lnSpc>
@@ -13900,7 +14039,7 @@
         <p:spPr>
           <a:xfrm>
             <a:off x="5952240" y="1046160"/>
-            <a:ext cx="2513880" cy="455040"/>
+            <a:ext cx="2513520" cy="454680"/>
           </a:xfrm>
           <a:prstGeom prst="rect">
             <a:avLst/>
@@ -13917,7 +14056,9 @@
           <a:fontRef idx="minor"/>
         </p:style>
         <p:txBody>
-          <a:bodyPr lIns="90000" rIns="90000" tIns="45000" bIns="45000"/>
+          <a:bodyPr lIns="90000" rIns="90000" tIns="45000" bIns="45000">
+            <a:noAutofit/>
+          </a:bodyPr>
           <a:p>
             <a:pPr>
               <a:lnSpc>
@@ -13961,7 +14102,7 @@
         <p:spPr>
           <a:xfrm>
             <a:off x="8086680" y="2476440"/>
-            <a:ext cx="2293920" cy="636840"/>
+            <a:ext cx="2293560" cy="636480"/>
           </a:xfrm>
           <a:prstGeom prst="rect">
             <a:avLst/>
@@ -13978,7 +14119,9 @@
           <a:fontRef idx="minor"/>
         </p:style>
         <p:txBody>
-          <a:bodyPr lIns="90000" rIns="90000" tIns="45000" bIns="45000"/>
+          <a:bodyPr lIns="90000" rIns="90000" tIns="45000" bIns="45000">
+            <a:noAutofit/>
+          </a:bodyPr>
           <a:p>
             <a:pPr>
               <a:lnSpc>
@@ -14031,7 +14174,7 @@
         <p:spPr>
           <a:xfrm>
             <a:off x="6180840" y="3587400"/>
-            <a:ext cx="1696320" cy="808200"/>
+            <a:ext cx="1695960" cy="807840"/>
           </a:xfrm>
           <a:prstGeom prst="roundRect">
             <a:avLst>
@@ -14055,7 +14198,9 @@
           <a:fontRef idx="minor"/>
         </p:style>
         <p:txBody>
-          <a:bodyPr lIns="90000" rIns="90000" tIns="45000" bIns="45000" anchor="ctr"/>
+          <a:bodyPr lIns="90000" rIns="90000" tIns="45000" bIns="45000" anchor="ctr">
+            <a:noAutofit/>
+          </a:bodyPr>
           <a:p>
             <a:pPr algn="ctr">
               <a:lnSpc>
@@ -14087,7 +14232,7 @@
         <p:spPr>
           <a:xfrm>
             <a:off x="7029360" y="2417760"/>
-            <a:ext cx="360" cy="1168560"/>
+            <a:ext cx="360" cy="1168200"/>
           </a:xfrm>
           <a:custGeom>
             <a:avLst/>
@@ -14130,7 +14275,7 @@
         <p:spPr>
           <a:xfrm>
             <a:off x="5838120" y="2826720"/>
-            <a:ext cx="2025720" cy="636840"/>
+            <a:ext cx="2025360" cy="636480"/>
           </a:xfrm>
           <a:prstGeom prst="rect">
             <a:avLst/>
@@ -14147,7 +14292,9 @@
           <a:fontRef idx="minor"/>
         </p:style>
         <p:txBody>
-          <a:bodyPr lIns="90000" rIns="90000" tIns="45000" bIns="45000"/>
+          <a:bodyPr lIns="90000" rIns="90000" tIns="45000" bIns="45000">
+            <a:noAutofit/>
+          </a:bodyPr>
           <a:p>
             <a:pPr>
               <a:lnSpc>
@@ -14200,7 +14347,7 @@
         <p:spPr>
           <a:xfrm>
             <a:off x="3798360" y="3587400"/>
-            <a:ext cx="1696320" cy="808200"/>
+            <a:ext cx="1695960" cy="807840"/>
           </a:xfrm>
           <a:prstGeom prst="roundRect">
             <a:avLst>
@@ -14224,7 +14371,9 @@
           <a:fontRef idx="minor"/>
         </p:style>
         <p:txBody>
-          <a:bodyPr lIns="90000" rIns="90000" tIns="45000" bIns="45000" anchor="ctr"/>
+          <a:bodyPr lIns="90000" rIns="90000" tIns="45000" bIns="45000" anchor="ctr">
+            <a:noAutofit/>
+          </a:bodyPr>
           <a:p>
             <a:pPr algn="ctr">
               <a:lnSpc>
@@ -14255,8 +14404,8 @@
         </p:nvSpPr>
         <p:spPr>
           <a:xfrm flipH="1" flipV="1">
-            <a:off x="5494320" y="3989520"/>
-            <a:ext cx="685080" cy="360"/>
+            <a:off x="5494320" y="3988800"/>
+            <a:ext cx="684720" cy="360"/>
           </a:xfrm>
           <a:custGeom>
             <a:avLst/>
@@ -14298,8 +14447,8 @@
         </p:nvSpPr>
         <p:spPr>
           <a:xfrm flipH="1">
-            <a:off x="2970360" y="3991680"/>
-            <a:ext cx="825840" cy="360"/>
+            <a:off x="2969640" y="3991680"/>
+            <a:ext cx="825480" cy="360"/>
           </a:xfrm>
           <a:custGeom>
             <a:avLst/>
@@ -14342,7 +14491,7 @@
         <p:spPr>
           <a:xfrm>
             <a:off x="1310040" y="3587400"/>
-            <a:ext cx="1661040" cy="808200"/>
+            <a:ext cx="1660680" cy="807840"/>
           </a:xfrm>
           <a:prstGeom prst="roundRect">
             <a:avLst>
@@ -14366,7 +14515,9 @@
           <a:fontRef idx="minor"/>
         </p:style>
         <p:txBody>
-          <a:bodyPr lIns="90000" rIns="90000" tIns="45000" bIns="45000" anchor="ctr"/>
+          <a:bodyPr lIns="90000" rIns="90000" tIns="45000" bIns="45000" anchor="ctr">
+            <a:noAutofit/>
+          </a:bodyPr>
           <a:p>
             <a:pPr algn="ctr">
               <a:lnSpc>
@@ -14398,7 +14549,7 @@
         <p:spPr>
           <a:xfrm>
             <a:off x="1310040" y="4952880"/>
-            <a:ext cx="1661040" cy="808200"/>
+            <a:ext cx="1660680" cy="807840"/>
           </a:xfrm>
           <a:prstGeom prst="roundRect">
             <a:avLst>
@@ -14422,7 +14573,9 @@
           <a:fontRef idx="minor"/>
         </p:style>
         <p:txBody>
-          <a:bodyPr lIns="90000" rIns="90000" tIns="45000" bIns="45000" anchor="ctr"/>
+          <a:bodyPr lIns="90000" rIns="90000" tIns="45000" bIns="45000" anchor="ctr">
+            <a:noAutofit/>
+          </a:bodyPr>
           <a:p>
             <a:pPr algn="ctr">
               <a:lnSpc>
@@ -14454,7 +14607,7 @@
         <p:spPr>
           <a:xfrm>
             <a:off x="3798360" y="4952880"/>
-            <a:ext cx="1696320" cy="808200"/>
+            <a:ext cx="1695960" cy="807840"/>
           </a:xfrm>
           <a:prstGeom prst="roundRect">
             <a:avLst>
@@ -14478,7 +14631,9 @@
           <a:fontRef idx="minor"/>
         </p:style>
         <p:txBody>
-          <a:bodyPr lIns="90000" rIns="90000" tIns="45000" bIns="45000" anchor="ctr"/>
+          <a:bodyPr lIns="90000" rIns="90000" tIns="45000" bIns="45000" anchor="ctr">
+            <a:noAutofit/>
+          </a:bodyPr>
           <a:p>
             <a:pPr algn="ctr">
               <a:lnSpc>
@@ -14510,7 +14665,7 @@
         <p:spPr>
           <a:xfrm>
             <a:off x="2971800" y="5357520"/>
-            <a:ext cx="825840" cy="360"/>
+            <a:ext cx="825480" cy="360"/>
           </a:xfrm>
           <a:custGeom>
             <a:avLst/>
@@ -14552,8 +14707,8 @@
         </p:nvSpPr>
         <p:spPr>
           <a:xfrm flipH="1">
-            <a:off x="2138760" y="4396320"/>
-            <a:ext cx="360" cy="556200"/>
+            <a:off x="2138040" y="4396320"/>
+            <a:ext cx="360" cy="555840"/>
           </a:xfrm>
           <a:custGeom>
             <a:avLst/>
@@ -14596,7 +14751,7 @@
         <p:spPr>
           <a:xfrm>
             <a:off x="2442240" y="2959920"/>
-            <a:ext cx="2025720" cy="636840"/>
+            <a:ext cx="2025360" cy="636480"/>
           </a:xfrm>
           <a:prstGeom prst="rect">
             <a:avLst/>
@@ -14613,7 +14768,9 @@
           <a:fontRef idx="minor"/>
         </p:style>
         <p:txBody>
-          <a:bodyPr lIns="90000" rIns="90000" tIns="45000" bIns="45000"/>
+          <a:bodyPr lIns="90000" rIns="90000" tIns="45000" bIns="45000">
+            <a:noAutofit/>
+          </a:bodyPr>
           <a:p>
             <a:pPr>
               <a:lnSpc>
@@ -14657,7 +14814,7 @@
         <p:spPr>
           <a:xfrm>
             <a:off x="624240" y="4396320"/>
-            <a:ext cx="2025720" cy="455040"/>
+            <a:ext cx="2025360" cy="454680"/>
           </a:xfrm>
           <a:prstGeom prst="rect">
             <a:avLst/>
@@ -14674,7 +14831,9 @@
           <a:fontRef idx="minor"/>
         </p:style>
         <p:txBody>
-          <a:bodyPr lIns="90000" rIns="90000" tIns="45000" bIns="45000"/>
+          <a:bodyPr lIns="90000" rIns="90000" tIns="45000" bIns="45000">
+            <a:noAutofit/>
+          </a:bodyPr>
           <a:p>
             <a:pPr>
               <a:lnSpc>
@@ -14718,7 +14877,7 @@
         <p:spPr>
           <a:xfrm>
             <a:off x="2804760" y="5635800"/>
-            <a:ext cx="2171160" cy="455040"/>
+            <a:ext cx="2170800" cy="454680"/>
           </a:xfrm>
           <a:prstGeom prst="rect">
             <a:avLst/>
@@ -14735,7 +14894,9 @@
           <a:fontRef idx="minor"/>
         </p:style>
         <p:txBody>
-          <a:bodyPr lIns="90000" rIns="90000" tIns="45000" bIns="45000"/>
+          <a:bodyPr lIns="90000" rIns="90000" tIns="45000" bIns="45000">
+            <a:noAutofit/>
+          </a:bodyPr>
           <a:p>
             <a:pPr>
               <a:lnSpc>
@@ -14789,33 +14950,6 @@
       <p:transition spd="slow"/>
     </mc:Fallback>
   </mc:AlternateContent>
-  <p:timing>
-    <p:tnLst>
-      <p:par>
-        <p:cTn id="11" dur="indefinite" restart="never" nodeType="tmRoot">
-          <p:childTnLst>
-            <p:seq>
-              <p:cTn id="12" dur="indefinite" nodeType="mainSeq"/>
-              <p:prevCondLst>
-                <p:cond delay="0" evt="onPrev">
-                  <p:tgtEl>
-                    <p:sldTgt/>
-                  </p:tgtEl>
-                </p:cond>
-              </p:prevCondLst>
-              <p:nextCondLst>
-                <p:cond delay="0" evt="onNext">
-                  <p:tgtEl>
-                    <p:sldTgt/>
-                  </p:tgtEl>
-                </p:cond>
-              </p:nextCondLst>
-            </p:seq>
-          </p:childTnLst>
-        </p:cTn>
-      </p:par>
-    </p:tnLst>
-  </p:timing>
 </p:sld>
 </file>
 
@@ -14845,7 +14979,7 @@
         <p:spPr>
           <a:xfrm>
             <a:off x="1341720" y="2876040"/>
-            <a:ext cx="1823400" cy="880200"/>
+            <a:ext cx="1823040" cy="879840"/>
           </a:xfrm>
           <a:prstGeom prst="roundRect">
             <a:avLst>
@@ -14869,7 +15003,9 @@
           <a:fontRef idx="minor"/>
         </p:style>
         <p:txBody>
-          <a:bodyPr lIns="90000" rIns="90000" tIns="45000" bIns="45000" anchor="ctr"/>
+          <a:bodyPr lIns="90000" rIns="90000" tIns="45000" bIns="45000" anchor="ctr">
+            <a:noAutofit/>
+          </a:bodyPr>
           <a:p>
             <a:pPr algn="ctr">
               <a:lnSpc>
@@ -14901,7 +15037,7 @@
         <p:spPr>
           <a:xfrm>
             <a:off x="240480" y="3121200"/>
-            <a:ext cx="408960" cy="389880"/>
+            <a:ext cx="408600" cy="389520"/>
           </a:xfrm>
           <a:prstGeom prst="ellipse">
             <a:avLst/>
@@ -14932,7 +15068,7 @@
         <p:spPr>
           <a:xfrm>
             <a:off x="6355800" y="1915920"/>
-            <a:ext cx="1823400" cy="880200"/>
+            <a:ext cx="1823040" cy="879840"/>
           </a:xfrm>
           <a:prstGeom prst="roundRect">
             <a:avLst>
@@ -14956,7 +15092,9 @@
           <a:fontRef idx="minor"/>
         </p:style>
         <p:txBody>
-          <a:bodyPr lIns="90000" rIns="90000" tIns="45000" bIns="45000" anchor="ctr"/>
+          <a:bodyPr lIns="90000" rIns="90000" tIns="45000" bIns="45000" anchor="ctr">
+            <a:noAutofit/>
+          </a:bodyPr>
           <a:p>
             <a:pPr algn="ctr">
               <a:lnSpc>
@@ -14988,7 +15126,7 @@
         <p:spPr>
           <a:xfrm>
             <a:off x="6355800" y="3677760"/>
-            <a:ext cx="1823400" cy="880200"/>
+            <a:ext cx="1823040" cy="879840"/>
           </a:xfrm>
           <a:prstGeom prst="roundRect">
             <a:avLst>
@@ -15012,7 +15150,9 @@
           <a:fontRef idx="minor"/>
         </p:style>
         <p:txBody>
-          <a:bodyPr lIns="90000" rIns="90000" tIns="45000" bIns="45000" anchor="ctr"/>
+          <a:bodyPr lIns="90000" rIns="90000" tIns="45000" bIns="45000" anchor="ctr">
+            <a:noAutofit/>
+          </a:bodyPr>
           <a:p>
             <a:pPr algn="ctr">
               <a:lnSpc>
@@ -15043,8 +15183,8 @@
         </p:nvSpPr>
         <p:spPr>
           <a:xfrm flipV="1">
-            <a:off x="649800" y="3314520"/>
-            <a:ext cx="690840" cy="360"/>
+            <a:off x="649800" y="3313800"/>
+            <a:ext cx="690480" cy="360"/>
           </a:xfrm>
           <a:custGeom>
             <a:avLst/>
@@ -15087,7 +15227,7 @@
         <p:spPr>
           <a:xfrm>
             <a:off x="3840120" y="2876040"/>
-            <a:ext cx="1823400" cy="880200"/>
+            <a:ext cx="1823040" cy="879840"/>
           </a:xfrm>
           <a:prstGeom prst="roundRect">
             <a:avLst>
@@ -15111,7 +15251,9 @@
           <a:fontRef idx="minor"/>
         </p:style>
         <p:txBody>
-          <a:bodyPr lIns="90000" rIns="90000" tIns="45000" bIns="45000" anchor="ctr"/>
+          <a:bodyPr lIns="90000" rIns="90000" tIns="45000" bIns="45000" anchor="ctr">
+            <a:noAutofit/>
+          </a:bodyPr>
           <a:p>
             <a:pPr algn="ctr">
               <a:lnSpc>
@@ -15143,7 +15285,7 @@
         <p:spPr>
           <a:xfrm>
             <a:off x="3165480" y="3316680"/>
-            <a:ext cx="673920" cy="360"/>
+            <a:ext cx="673560" cy="360"/>
           </a:xfrm>
           <a:custGeom>
             <a:avLst/>
@@ -15185,8 +15327,8 @@
         </p:nvSpPr>
         <p:spPr>
           <a:xfrm flipV="1" rot="16200000">
-            <a:off x="3503520" y="1625760"/>
-            <a:ext cx="11880" cy="2498040"/>
+            <a:off x="3503880" y="1625760"/>
+            <a:ext cx="11520" cy="2497680"/>
           </a:xfrm>
           <a:prstGeom prst="curvedConnector3">
             <a:avLst>
@@ -15217,8 +15359,8 @@
         </p:nvSpPr>
         <p:spPr>
           <a:xfrm flipV="1">
-            <a:off x="5664240" y="2355480"/>
-            <a:ext cx="690840" cy="959400"/>
+            <a:off x="5664240" y="2355120"/>
+            <a:ext cx="690480" cy="959040"/>
           </a:xfrm>
           <a:custGeom>
             <a:avLst/>
@@ -15261,7 +15403,7 @@
         <p:spPr>
           <a:xfrm>
             <a:off x="5664240" y="3316680"/>
-            <a:ext cx="690840" cy="801360"/>
+            <a:ext cx="690480" cy="801000"/>
           </a:xfrm>
           <a:custGeom>
             <a:avLst/>
@@ -15304,7 +15446,7 @@
         <p:spPr>
           <a:xfrm>
             <a:off x="2597400" y="2226600"/>
-            <a:ext cx="1823400" cy="424800"/>
+            <a:ext cx="1823040" cy="424440"/>
           </a:xfrm>
           <a:prstGeom prst="rect">
             <a:avLst/>
@@ -15321,7 +15463,9 @@
           <a:fontRef idx="minor"/>
         </p:style>
         <p:txBody>
-          <a:bodyPr lIns="90000" rIns="90000" tIns="45000" bIns="45000"/>
+          <a:bodyPr lIns="90000" rIns="90000" tIns="45000" bIns="45000">
+            <a:noAutofit/>
+          </a:bodyPr>
           <a:p>
             <a:pPr>
               <a:lnSpc>
@@ -15374,7 +15518,7 @@
         <p:spPr>
           <a:xfrm>
             <a:off x="2597400" y="3850920"/>
-            <a:ext cx="1965240" cy="455040"/>
+            <a:ext cx="1964880" cy="454680"/>
           </a:xfrm>
           <a:prstGeom prst="rect">
             <a:avLst/>
@@ -15391,7 +15535,9 @@
           <a:fontRef idx="minor"/>
         </p:style>
         <p:txBody>
-          <a:bodyPr lIns="90000" rIns="90000" tIns="45000" bIns="45000"/>
+          <a:bodyPr lIns="90000" rIns="90000" tIns="45000" bIns="45000">
+            <a:noAutofit/>
+          </a:bodyPr>
           <a:p>
             <a:pPr>
               <a:lnSpc>
@@ -15444,7 +15590,7 @@
         <p:spPr>
           <a:xfrm>
             <a:off x="4454640" y="2141640"/>
-            <a:ext cx="1900440" cy="636840"/>
+            <a:ext cx="1900080" cy="636480"/>
           </a:xfrm>
           <a:prstGeom prst="rect">
             <a:avLst/>
@@ -15461,7 +15607,9 @@
           <a:fontRef idx="minor"/>
         </p:style>
         <p:txBody>
-          <a:bodyPr lIns="90000" rIns="90000" tIns="45000" bIns="45000"/>
+          <a:bodyPr lIns="90000" rIns="90000" tIns="45000" bIns="45000">
+            <a:noAutofit/>
+          </a:bodyPr>
           <a:p>
             <a:pPr>
               <a:lnSpc>
@@ -15505,7 +15653,7 @@
         <p:spPr>
           <a:xfrm>
             <a:off x="4416120" y="4060800"/>
-            <a:ext cx="1900440" cy="636840"/>
+            <a:ext cx="1900080" cy="636480"/>
           </a:xfrm>
           <a:prstGeom prst="rect">
             <a:avLst/>
@@ -15522,7 +15670,9 @@
           <a:fontRef idx="minor"/>
         </p:style>
         <p:txBody>
-          <a:bodyPr lIns="90000" rIns="90000" tIns="45000" bIns="45000"/>
+          <a:bodyPr lIns="90000" rIns="90000" tIns="45000" bIns="45000">
+            <a:noAutofit/>
+          </a:bodyPr>
           <a:p>
             <a:pPr>
               <a:lnSpc>
@@ -15575,7 +15725,7 @@
         <p:spPr>
           <a:xfrm>
             <a:off x="8767800" y="2831760"/>
-            <a:ext cx="1823400" cy="880200"/>
+            <a:ext cx="1823040" cy="879840"/>
           </a:xfrm>
           <a:prstGeom prst="roundRect">
             <a:avLst>
@@ -15599,7 +15749,9 @@
           <a:fontRef idx="minor"/>
         </p:style>
         <p:txBody>
-          <a:bodyPr lIns="90000" rIns="90000" tIns="45000" bIns="45000" anchor="ctr"/>
+          <a:bodyPr lIns="90000" rIns="90000" tIns="45000" bIns="45000" anchor="ctr">
+            <a:noAutofit/>
+          </a:bodyPr>
           <a:p>
             <a:pPr algn="ctr">
               <a:lnSpc>
@@ -15631,7 +15783,7 @@
         <p:spPr>
           <a:xfrm>
             <a:off x="8179920" y="2356200"/>
-            <a:ext cx="587520" cy="915120"/>
+            <a:ext cx="587160" cy="914760"/>
           </a:xfrm>
           <a:custGeom>
             <a:avLst/>
@@ -15674,7 +15826,7 @@
         <p:spPr>
           <a:xfrm flipV="1">
             <a:off x="8179920" y="3271680"/>
-            <a:ext cx="587520" cy="845640"/>
+            <a:ext cx="587160" cy="845280"/>
           </a:xfrm>
           <a:custGeom>
             <a:avLst/>
@@ -15716,8 +15868,8 @@
         </p:nvSpPr>
         <p:spPr>
           <a:xfrm flipH="1" flipV="1" rot="16200000">
-            <a:off x="5943960" y="-858600"/>
-            <a:ext cx="43560" cy="7425720"/>
+            <a:off x="5943960" y="-857880"/>
+            <a:ext cx="43200" cy="7425360"/>
           </a:xfrm>
           <a:prstGeom prst="curvedConnector3">
             <a:avLst>
@@ -15749,7 +15901,7 @@
         <p:spPr>
           <a:xfrm>
             <a:off x="5187600" y="685800"/>
-            <a:ext cx="1900440" cy="455040"/>
+            <a:ext cx="1900080" cy="454680"/>
           </a:xfrm>
           <a:prstGeom prst="rect">
             <a:avLst/>
@@ -15766,7 +15918,9 @@
           <a:fontRef idx="minor"/>
         </p:style>
         <p:txBody>
-          <a:bodyPr lIns="90000" rIns="90000" tIns="45000" bIns="45000"/>
+          <a:bodyPr lIns="90000" rIns="90000" tIns="45000" bIns="45000">
+            <a:noAutofit/>
+          </a:bodyPr>
           <a:p>
             <a:pPr>
               <a:lnSpc>
@@ -15811,33 +15965,6 @@
       <p:transition spd="slow"/>
     </mc:Fallback>
   </mc:AlternateContent>
-  <p:timing>
-    <p:tnLst>
-      <p:par>
-        <p:cTn id="13" dur="indefinite" restart="never" nodeType="tmRoot">
-          <p:childTnLst>
-            <p:seq>
-              <p:cTn id="14" dur="indefinite" nodeType="mainSeq"/>
-              <p:prevCondLst>
-                <p:cond delay="0" evt="onPrev">
-                  <p:tgtEl>
-                    <p:sldTgt/>
-                  </p:tgtEl>
-                </p:cond>
-              </p:prevCondLst>
-              <p:nextCondLst>
-                <p:cond delay="0" evt="onNext">
-                  <p:tgtEl>
-                    <p:sldTgt/>
-                  </p:tgtEl>
-                </p:cond>
-              </p:nextCondLst>
-            </p:seq>
-          </p:childTnLst>
-        </p:cTn>
-      </p:par>
-    </p:tnLst>
-  </p:timing>
 </p:sld>
 </file>
 

</xml_diff>